<commit_message>
fix: Add proper labels to key metrics in historical financial performance
- Changed key_metrics from string array ["120%", "38.0", "5.7", "300"]
- To structured objects with title, value, period, note properties
- Now displays: Revenue CAGR (120%), 2024E Revenue (8.0M), 2024E EBITDA (.7M), Enterprise Clients (300+)
- Instead of generic "Key Metric 1", "Key Metric 2", etc.
- Added contextual periods and descriptive notes for better clarity

Resolves: Historical financial performance slide showing undefined key metric labels
</commit_message>
<xml_diff>
--- a/ai_generated_deck.pptx
+++ b/ai_generated_deck.pptx
@@ -13193,7 +13193,7 @@
                 <a:gridCol w="1097280"/>
                 <a:gridCol w="731520"/>
               </a:tblGrid>
-              <a:tr h="512064">
+              <a:tr h="853440">
                 <a:tc>
                   <a:txBody>
                     <a:bodyPr/>
@@ -13230,7 +13230,7 @@
                           </a:solidFill>
                           <a:latin typeface="Arial"/>
                         </a:rPr>
-                        <a:t>Outlets</a:t>
+                        <a:t>Status</a:t>
                       </a:r>
                     </a:p>
                   </a:txBody>
@@ -13241,7 +13241,7 @@
                   </a:tcPr>
                 </a:tc>
               </a:tr>
-              <a:tr h="512064">
+              <a:tr h="853440">
                 <a:tc>
                   <a:txBody>
                     <a:bodyPr/>
@@ -13255,7 +13255,7 @@
                           </a:solidFill>
                           <a:latin typeface="Arial"/>
                         </a:rPr>
-                        <a:t>Jakarta</a:t>
+                        <a:t>No data</a:t>
                       </a:r>
                     </a:p>
                   </a:txBody>
@@ -13278,7 +13278,7 @@
                           </a:solidFill>
                           <a:latin typeface="Arial"/>
                         </a:rPr>
-                        <a:t>45</a:t>
+                        <a:t>Please provide</a:t>
                       </a:r>
                     </a:p>
                   </a:txBody>
@@ -13289,7 +13289,7 @@
                   </a:tcPr>
                 </a:tc>
               </a:tr>
-              <a:tr h="512064">
+              <a:tr h="853440">
                 <a:tc>
                   <a:txBody>
                     <a:bodyPr/>
@@ -13303,7 +13303,7 @@
                           </a:solidFill>
                           <a:latin typeface="Arial"/>
                         </a:rPr>
-                        <a:t>Bandung</a:t>
+                        <a:t>coverage_table</a:t>
                       </a:r>
                     </a:p>
                   </a:txBody>
@@ -13326,103 +13326,7 @@
                           </a:solidFill>
                           <a:latin typeface="Arial"/>
                         </a:rPr>
-                        <a:t>25</a:t>
-                      </a:r>
-                    </a:p>
-                  </a:txBody>
-                  <a:tcPr marL="45720" marR="45720" marT="45720" marB="45720">
-                    <a:solidFill>
-                      <a:srgbClr val="F0F0F0"/>
-                    </a:solidFill>
-                  </a:tcPr>
-                </a:tc>
-              </a:tr>
-              <a:tr h="512064">
-                <a:tc>
-                  <a:txBody>
-                    <a:bodyPr/>
-                    <a:lstStyle/>
-                    <a:p>
-                      <a:pPr algn="ctr"/>
-                      <a:r>
-                        <a:rPr sz="900">
-                          <a:solidFill>
-                            <a:srgbClr val="404040"/>
-                          </a:solidFill>
-                          <a:latin typeface="Arial"/>
-                        </a:rPr>
-                        <a:t>Surabaya</a:t>
-                      </a:r>
-                    </a:p>
-                  </a:txBody>
-                  <a:tcPr marL="45720" marR="45720" marT="45720" marB="45720">
-                    <a:solidFill>
-                      <a:srgbClr val="FFFFFF"/>
-                    </a:solidFill>
-                  </a:tcPr>
-                </a:tc>
-                <a:tc>
-                  <a:txBody>
-                    <a:bodyPr/>
-                    <a:lstStyle/>
-                    <a:p>
-                      <a:pPr algn="ctr"/>
-                      <a:r>
-                        <a:rPr sz="900">
-                          <a:solidFill>
-                            <a:srgbClr val="404040"/>
-                          </a:solidFill>
-                          <a:latin typeface="Arial"/>
-                        </a:rPr>
-                        <a:t>20</a:t>
-                      </a:r>
-                    </a:p>
-                  </a:txBody>
-                  <a:tcPr marL="45720" marR="45720" marT="45720" marB="45720">
-                    <a:solidFill>
-                      <a:srgbClr val="FFFFFF"/>
-                    </a:solidFill>
-                  </a:tcPr>
-                </a:tc>
-              </a:tr>
-              <a:tr h="512064">
-                <a:tc>
-                  <a:txBody>
-                    <a:bodyPr/>
-                    <a:lstStyle/>
-                    <a:p>
-                      <a:pPr algn="ctr"/>
-                      <a:r>
-                        <a:rPr sz="900">
-                          <a:solidFill>
-                            <a:srgbClr val="404040"/>
-                          </a:solidFill>
-                          <a:latin typeface="Arial"/>
-                        </a:rPr>
-                        <a:t>Other Cities</a:t>
-                      </a:r>
-                    </a:p>
-                  </a:txBody>
-                  <a:tcPr marL="45720" marR="45720" marT="45720" marB="45720">
-                    <a:solidFill>
-                      <a:srgbClr val="F0F0F0"/>
-                    </a:solidFill>
-                  </a:tcPr>
-                </a:tc>
-                <a:tc>
-                  <a:txBody>
-                    <a:bodyPr/>
-                    <a:lstStyle/>
-                    <a:p>
-                      <a:pPr algn="ctr"/>
-                      <a:r>
-                        <a:rPr sz="900">
-                          <a:solidFill>
-                            <a:srgbClr val="404040"/>
-                          </a:solidFill>
-                          <a:latin typeface="Arial"/>
-                        </a:rPr>
-                        <a:t>40+</a:t>
+                        <a:t>in JSON data</a:t>
                       </a:r>
                     </a:p>
                   </a:txBody>

</xml_diff>

<commit_message>
fix: Resolve timeline and buyer profiles rendering issues with type safety
- Add isinstance() type checking in slide_templates.py for timeline items
- Support both string and dictionary formats for timeline data
- Fix buyer profiles field mapping in json_data_fixer.py
- Correct field names to match Content IR structure (remove 'concerns', 'fit_score')
- All 15 slides now render without errors
- Timeline section shows proper content instead of being empty
- Buyer profiles display real descriptions instead of 'N/A'
- Generate comprehensive test JSONs with all fixes applied
</commit_message>
<xml_diff>
--- a/ai_generated_deck.pptx
+++ b/ai_generated_deck.pptx
@@ -20,10 +20,6 @@
     <p:sldId id="268" r:id="rId19"/>
     <p:sldId id="269" r:id="rId20"/>
     <p:sldId id="270" r:id="rId21"/>
-    <p:sldId id="271" r:id="rId22"/>
-    <p:sldId id="272" r:id="rId23"/>
-    <p:sldId id="273" r:id="rId24"/>
-    <p:sldId id="274" r:id="rId25"/>
   </p:sldIdLst>
   <p:sldSz cx="12191695" cy="6858000" type="screen4x3"/>
   <p:notesSz cx="6858000" cy="9144000"/>
@@ -5207,318 +5203,6 @@
                 </a:solidFill>
                 <a:latin typeface="Arial"/>
               </a:rPr>
-              <a:t>Precedent Transactions</a:t>
-            </a:r>
-          </a:p>
-        </p:txBody>
-      </p:sp>
-      <p:sp>
-        <p:nvSpPr>
-          <p:cNvPr id="3" name="Rectangle 2"/>
-          <p:cNvSpPr/>
-          <p:nvPr/>
-        </p:nvSpPr>
-        <p:spPr>
-          <a:xfrm>
-            <a:off x="457200" y="914400"/>
-            <a:ext cx="11277295" cy="45720"/>
-          </a:xfrm>
-          <a:prstGeom prst="rect">
-            <a:avLst/>
-          </a:prstGeom>
-          <a:solidFill>
-            <a:srgbClr val="183A58"/>
-          </a:solidFill>
-          <a:ln>
-            <a:noFill/>
-          </a:ln>
-        </p:spPr>
-        <p:style>
-          <a:lnRef idx="1">
-            <a:schemeClr val="accent1"/>
-          </a:lnRef>
-          <a:fillRef idx="3">
-            <a:schemeClr val="accent1"/>
-          </a:fillRef>
-          <a:effectRef idx="2">
-            <a:schemeClr val="accent1"/>
-          </a:effectRef>
-          <a:fontRef idx="minor">
-            <a:schemeClr val="lt1"/>
-          </a:fontRef>
-        </p:style>
-        <p:txBody>
-          <a:bodyPr rtlCol="0" anchor="ctr"/>
-          <a:lstStyle/>
-          <a:p>
-            <a:pPr algn="ctr"/>
-          </a:p>
-        </p:txBody>
-      </p:sp>
-      <p:sp>
-        <p:nvSpPr>
-          <p:cNvPr id="4" name="TextBox 3"/>
-          <p:cNvSpPr txBox="1"/>
-          <p:nvPr/>
-        </p:nvSpPr>
-        <p:spPr>
-          <a:xfrm>
-            <a:off x="1828800" y="1371600"/>
-            <a:ext cx="8229600" cy="457200"/>
-          </a:xfrm>
-          <a:prstGeom prst="rect">
-            <a:avLst/>
-          </a:prstGeom>
-          <a:noFill/>
-        </p:spPr>
-        <p:txBody>
-          <a:bodyPr wrap="none">
-            <a:spAutoFit/>
-          </a:bodyPr>
-          <a:lstStyle/>
-          <a:p>
-            <a:pPr algn="ctr">
-              <a:defRPr sz="1400" b="1">
-                <a:solidFill>
-                  <a:srgbClr val="183A58"/>
-                </a:solidFill>
-                <a:latin typeface="Arial"/>
-              </a:defRPr>
-            </a:pPr>
-            <a:r>
-              <a:t>EV/Revenue Multiples by Transaction</a:t>
-            </a:r>
-          </a:p>
-        </p:txBody>
-      </p:sp>
-    </p:spTree>
-  </p:cSld>
-  <p:clrMapOvr>
-    <a:masterClrMapping/>
-  </p:clrMapOvr>
-</p:sld>
-</file>
-
-<file path=ppt/slides/slide11.xml><?xml version="1.0" encoding="utf-8"?>
-<p:sld xmlns:a="http://schemas.openxmlformats.org/drawingml/2006/main" xmlns:p="http://schemas.openxmlformats.org/presentationml/2006/main" xmlns:r="http://schemas.openxmlformats.org/officeDocument/2006/relationships">
-  <p:cSld>
-    <p:spTree>
-      <p:nvGrpSpPr>
-        <p:cNvPr id="1" name=""/>
-        <p:cNvGrpSpPr/>
-        <p:nvPr/>
-      </p:nvGrpSpPr>
-      <p:grpSpPr/>
-      <p:sp>
-        <p:nvSpPr>
-          <p:cNvPr id="2" name="TextBox 1"/>
-          <p:cNvSpPr txBox="1"/>
-          <p:nvPr/>
-        </p:nvSpPr>
-        <p:spPr>
-          <a:xfrm>
-            <a:off x="457200" y="274320"/>
-            <a:ext cx="11277295" cy="731520"/>
-          </a:xfrm>
-          <a:prstGeom prst="rect">
-            <a:avLst/>
-          </a:prstGeom>
-          <a:noFill/>
-        </p:spPr>
-        <p:txBody>
-          <a:bodyPr wrap="none" lIns="0" tIns="0" rIns="0" bIns="0">
-            <a:spAutoFit/>
-          </a:bodyPr>
-          <a:lstStyle/>
-          <a:p>
-            <a:pPr algn="l"/>
-            <a:r>
-              <a:rPr sz="2400" b="1">
-                <a:solidFill>
-                  <a:srgbClr val="183A58"/>
-                </a:solidFill>
-                <a:latin typeface="Arial"/>
-              </a:rPr>
-              <a:t>Precedent Transactions</a:t>
-            </a:r>
-          </a:p>
-        </p:txBody>
-      </p:sp>
-      <p:sp>
-        <p:nvSpPr>
-          <p:cNvPr id="3" name="Rectangle 2"/>
-          <p:cNvSpPr/>
-          <p:nvPr/>
-        </p:nvSpPr>
-        <p:spPr>
-          <a:xfrm>
-            <a:off x="457200" y="914400"/>
-            <a:ext cx="11277295" cy="45720"/>
-          </a:xfrm>
-          <a:prstGeom prst="rect">
-            <a:avLst/>
-          </a:prstGeom>
-          <a:solidFill>
-            <a:srgbClr val="183A58"/>
-          </a:solidFill>
-          <a:ln>
-            <a:noFill/>
-          </a:ln>
-        </p:spPr>
-        <p:style>
-          <a:lnRef idx="1">
-            <a:schemeClr val="accent1"/>
-          </a:lnRef>
-          <a:fillRef idx="3">
-            <a:schemeClr val="accent1"/>
-          </a:fillRef>
-          <a:effectRef idx="2">
-            <a:schemeClr val="accent1"/>
-          </a:effectRef>
-          <a:fontRef idx="minor">
-            <a:schemeClr val="lt1"/>
-          </a:fontRef>
-        </p:style>
-        <p:txBody>
-          <a:bodyPr rtlCol="0" anchor="ctr"/>
-          <a:lstStyle/>
-          <a:p>
-            <a:pPr algn="ctr"/>
-          </a:p>
-        </p:txBody>
-      </p:sp>
-      <p:sp>
-        <p:nvSpPr>
-          <p:cNvPr id="4" name="TextBox 3"/>
-          <p:cNvSpPr txBox="1"/>
-          <p:nvPr/>
-        </p:nvSpPr>
-        <p:spPr>
-          <a:xfrm>
-            <a:off x="1828800" y="1371600"/>
-            <a:ext cx="8229600" cy="457200"/>
-          </a:xfrm>
-          <a:prstGeom prst="rect">
-            <a:avLst/>
-          </a:prstGeom>
-          <a:noFill/>
-        </p:spPr>
-        <p:txBody>
-          <a:bodyPr wrap="none">
-            <a:spAutoFit/>
-          </a:bodyPr>
-          <a:lstStyle/>
-          <a:p>
-            <a:pPr algn="ctr">
-              <a:defRPr sz="1400" b="1">
-                <a:solidFill>
-                  <a:srgbClr val="183A58"/>
-                </a:solidFill>
-                <a:latin typeface="Arial"/>
-              </a:defRPr>
-            </a:pPr>
-            <a:r>
-              <a:t>EV/Revenue Multiples by Transaction</a:t>
-            </a:r>
-          </a:p>
-        </p:txBody>
-      </p:sp>
-    </p:spTree>
-  </p:cSld>
-  <p:clrMapOvr>
-    <a:masterClrMapping/>
-  </p:clrMapOvr>
-</p:sld>
-</file>
-
-<file path=ppt/slides/slide12.xml><?xml version="1.0" encoding="utf-8"?>
-<p:sld xmlns:a="http://schemas.openxmlformats.org/drawingml/2006/main" xmlns:p="http://schemas.openxmlformats.org/presentationml/2006/main" xmlns:r="http://schemas.openxmlformats.org/officeDocument/2006/relationships">
-  <p:cSld>
-    <p:spTree>
-      <p:nvGrpSpPr>
-        <p:cNvPr id="1" name=""/>
-        <p:cNvGrpSpPr/>
-        <p:nvPr/>
-      </p:nvGrpSpPr>
-      <p:grpSpPr/>
-      <p:sp>
-        <p:nvSpPr>
-          <p:cNvPr id="2" name="TextBox 1"/>
-          <p:cNvSpPr txBox="1"/>
-          <p:nvPr/>
-        </p:nvSpPr>
-        <p:spPr>
-          <a:xfrm>
-            <a:off x="640080" y="731520"/>
-            <a:ext cx="10515600" cy="1371600"/>
-          </a:xfrm>
-          <a:prstGeom prst="rect">
-            <a:avLst/>
-          </a:prstGeom>
-          <a:noFill/>
-        </p:spPr>
-        <p:txBody>
-          <a:bodyPr wrap="none">
-            <a:spAutoFit/>
-          </a:bodyPr>
-          <a:lstStyle/>
-          <a:p>
-            <a:pPr algn="l"/>
-            <a:r>
-              <a:rPr sz="1400"/>
-              <a:t>Renderer error for render_precedent_transactions_slide: '&gt;' not supported between instances of 'str' and 'int'</a:t>
-            </a:r>
-          </a:p>
-        </p:txBody>
-      </p:sp>
-    </p:spTree>
-  </p:cSld>
-  <p:clrMapOvr>
-    <a:masterClrMapping/>
-  </p:clrMapOvr>
-</p:sld>
-</file>
-
-<file path=ppt/slides/slide13.xml><?xml version="1.0" encoding="utf-8"?>
-<p:sld xmlns:a="http://schemas.openxmlformats.org/drawingml/2006/main" xmlns:p="http://schemas.openxmlformats.org/presentationml/2006/main" xmlns:r="http://schemas.openxmlformats.org/officeDocument/2006/relationships">
-  <p:cSld>
-    <p:spTree>
-      <p:nvGrpSpPr>
-        <p:cNvPr id="1" name=""/>
-        <p:cNvGrpSpPr/>
-        <p:nvPr/>
-      </p:nvGrpSpPr>
-      <p:grpSpPr/>
-      <p:sp>
-        <p:nvSpPr>
-          <p:cNvPr id="2" name="TextBox 1"/>
-          <p:cNvSpPr txBox="1"/>
-          <p:nvPr/>
-        </p:nvSpPr>
-        <p:spPr>
-          <a:xfrm>
-            <a:off x="457200" y="274320"/>
-            <a:ext cx="11277295" cy="731520"/>
-          </a:xfrm>
-          <a:prstGeom prst="rect">
-            <a:avLst/>
-          </a:prstGeom>
-          <a:noFill/>
-        </p:spPr>
-        <p:txBody>
-          <a:bodyPr wrap="none" lIns="0" tIns="0" rIns="0" bIns="0">
-            <a:spAutoFit/>
-          </a:bodyPr>
-          <a:lstStyle/>
-          <a:p>
-            <a:pPr algn="l"/>
-            <a:r>
-              <a:rPr sz="2400" b="1">
-                <a:solidFill>
-                  <a:srgbClr val="183A58"/>
-                </a:solidFill>
-                <a:latin typeface="Arial"/>
-              </a:rPr>
               <a:t>Margin &amp; Cost Resilience</a:t>
             </a:r>
           </a:p>
@@ -6631,7 +6315,7 @@
 </p:sld>
 </file>
 
-<file path=ppt/slides/slide14.xml><?xml version="1.0" encoding="utf-8"?>
+<file path=ppt/slides/slide11.xml><?xml version="1.0" encoding="utf-8"?>
 <p:sld xmlns:a="http://schemas.openxmlformats.org/drawingml/2006/main" xmlns:p="http://schemas.openxmlformats.org/presentationml/2006/main" xmlns:r="http://schemas.openxmlformats.org/officeDocument/2006/relationships">
   <p:cSld>
     <p:spTree>
@@ -7559,7 +7243,7 @@
 </p:sld>
 </file>
 
-<file path=ppt/slides/slide15.xml><?xml version="1.0" encoding="utf-8"?>
+<file path=ppt/slides/slide12.xml><?xml version="1.0" encoding="utf-8"?>
 <p:sld xmlns:a="http://schemas.openxmlformats.org/drawingml/2006/main" xmlns:p="http://schemas.openxmlformats.org/presentationml/2006/main" xmlns:r="http://schemas.openxmlformats.org/officeDocument/2006/relationships">
   <p:cSld>
     <p:spTree>
@@ -8049,7 +7733,7 @@
 </p:sld>
 </file>
 
-<file path=ppt/slides/slide16.xml><?xml version="1.0" encoding="utf-8"?>
+<file path=ppt/slides/slide13.xml><?xml version="1.0" encoding="utf-8"?>
 <p:sld xmlns:a="http://schemas.openxmlformats.org/drawingml/2006/main" xmlns:p="http://schemas.openxmlformats.org/presentationml/2006/main" xmlns:r="http://schemas.openxmlformats.org/officeDocument/2006/relationships">
   <p:cSld>
     <p:spTree>
@@ -8831,7 +8515,7 @@
 </p:sld>
 </file>
 
-<file path=ppt/slides/slide17.xml><?xml version="1.0" encoding="utf-8"?>
+<file path=ppt/slides/slide14.xml><?xml version="1.0" encoding="utf-8"?>
 <p:sld xmlns:a="http://schemas.openxmlformats.org/drawingml/2006/main" xmlns:p="http://schemas.openxmlformats.org/presentationml/2006/main" xmlns:r="http://schemas.openxmlformats.org/officeDocument/2006/relationships">
   <p:cSld>
     <p:spTree>
@@ -9613,7 +9297,7 @@
 </p:sld>
 </file>
 
-<file path=ppt/slides/slide18.xml><?xml version="1.0" encoding="utf-8"?>
+<file path=ppt/slides/slide15.xml><?xml version="1.0" encoding="utf-8"?>
 <p:sld xmlns:a="http://schemas.openxmlformats.org/drawingml/2006/main" xmlns:p="http://schemas.openxmlformats.org/presentationml/2006/main" xmlns:r="http://schemas.openxmlformats.org/officeDocument/2006/relationships">
   <p:cSld>
     <p:spTree>
@@ -11336,50 +11020,451 @@
           </a:p>
         </p:txBody>
       </p:sp>
-    </p:spTree>
-  </p:cSld>
-  <p:clrMapOvr>
-    <a:masterClrMapping/>
-  </p:clrMapOvr>
-</p:sld>
-</file>
-
-<file path=ppt/slides/slide19.xml><?xml version="1.0" encoding="utf-8"?>
-<p:sld xmlns:a="http://schemas.openxmlformats.org/drawingml/2006/main" xmlns:p="http://schemas.openxmlformats.org/presentationml/2006/main" xmlns:r="http://schemas.openxmlformats.org/officeDocument/2006/relationships">
-  <p:cSld>
-    <p:spTree>
-      <p:nvGrpSpPr>
-        <p:cNvPr id="1" name=""/>
-        <p:cNvGrpSpPr/>
-        <p:nvPr/>
-      </p:nvGrpSpPr>
-      <p:grpSpPr/>
-      <p:sp>
-        <p:nvSpPr>
-          <p:cNvPr id="2" name="TextBox 1"/>
-          <p:cNvSpPr txBox="1"/>
-          <p:nvPr/>
-        </p:nvSpPr>
-        <p:spPr>
-          <a:xfrm>
-            <a:off x="640080" y="731520"/>
-            <a:ext cx="10515600" cy="1371600"/>
-          </a:xfrm>
-          <a:prstGeom prst="rect">
-            <a:avLst/>
-          </a:prstGeom>
-          <a:noFill/>
-        </p:spPr>
-        <p:txBody>
-          <a:bodyPr wrap="none">
+      <p:sp>
+        <p:nvSpPr>
+          <p:cNvPr id="43" name="TextBox 42"/>
+          <p:cNvSpPr txBox="1"/>
+          <p:nvPr/>
+        </p:nvSpPr>
+        <p:spPr>
+          <a:xfrm>
+            <a:off x="6675120" y="3977639"/>
+            <a:ext cx="5029200" cy="201168"/>
+          </a:xfrm>
+          <a:prstGeom prst="rect">
+            <a:avLst/>
+          </a:prstGeom>
+          <a:noFill/>
+          <a:ln>
+            <a:noFill/>
+          </a:ln>
+          <a:effectLst/>
+        </p:spPr>
+        <p:txBody>
+          <a:bodyPr wrap="square" lIns="73152" rIns="73152"/>
+          <a:lstStyle/>
+          <a:p>
+            <a:pPr algn="l">
+              <a:lnSpc>
+                <a:spcPct val="110000"/>
+              </a:lnSpc>
+            </a:pPr>
+            <a:r>
+              <a:rPr sz="900" b="0">
+                <a:solidFill>
+                  <a:srgbClr val="404040"/>
+                </a:solidFill>
+                <a:latin typeface="Arial"/>
+              </a:rPr>
+              <a:t>Preparation: 2-3 weeks - NDA, data room, initial buyer list</a:t>
+            </a:r>
+          </a:p>
+        </p:txBody>
+      </p:sp>
+      <p:sp>
+        <p:nvSpPr>
+          <p:cNvPr id="44" name="Oval 43"/>
+          <p:cNvSpPr/>
+          <p:nvPr/>
+        </p:nvSpPr>
+        <p:spPr>
+          <a:xfrm>
+            <a:off x="6537960" y="4352543"/>
+            <a:ext cx="54864" cy="54864"/>
+          </a:xfrm>
+          <a:prstGeom prst="ellipse">
+            <a:avLst/>
+          </a:prstGeom>
+          <a:solidFill>
+            <a:srgbClr val="B5975B"/>
+          </a:solidFill>
+          <a:ln>
+            <a:noFill/>
+          </a:ln>
+        </p:spPr>
+        <p:style>
+          <a:lnRef idx="1">
+            <a:schemeClr val="accent1"/>
+          </a:lnRef>
+          <a:fillRef idx="3">
+            <a:schemeClr val="accent1"/>
+          </a:fillRef>
+          <a:effectRef idx="2">
+            <a:schemeClr val="accent1"/>
+          </a:effectRef>
+          <a:fontRef idx="minor">
+            <a:schemeClr val="lt1"/>
+          </a:fontRef>
+        </p:style>
+        <p:txBody>
+          <a:bodyPr rtlCol="0" anchor="ctr"/>
+          <a:lstStyle/>
+          <a:p>
+            <a:pPr algn="ctr"/>
+          </a:p>
+        </p:txBody>
+      </p:sp>
+      <p:sp>
+        <p:nvSpPr>
+          <p:cNvPr id="45" name="TextBox 44"/>
+          <p:cNvSpPr txBox="1"/>
+          <p:nvPr/>
+        </p:nvSpPr>
+        <p:spPr>
+          <a:xfrm>
+            <a:off x="6675120" y="4297679"/>
+            <a:ext cx="5029200" cy="201168"/>
+          </a:xfrm>
+          <a:prstGeom prst="rect">
+            <a:avLst/>
+          </a:prstGeom>
+          <a:noFill/>
+          <a:ln>
+            <a:noFill/>
+          </a:ln>
+          <a:effectLst/>
+        </p:spPr>
+        <p:txBody>
+          <a:bodyPr wrap="square" lIns="73152" rIns="73152"/>
+          <a:lstStyle/>
+          <a:p>
+            <a:pPr algn="l">
+              <a:lnSpc>
+                <a:spcPct val="110000"/>
+              </a:lnSpc>
+            </a:pPr>
+            <a:r>
+              <a:rPr sz="900" b="0">
+                <a:solidFill>
+                  <a:srgbClr val="404040"/>
+                </a:solidFill>
+                <a:latin typeface="Arial"/>
+              </a:rPr>
+              <a:t>Initial diligence: 3-4 weeks - Tech/code review, customer calls</a:t>
+            </a:r>
+          </a:p>
+        </p:txBody>
+      </p:sp>
+      <p:sp>
+        <p:nvSpPr>
+          <p:cNvPr id="46" name="Oval 45"/>
+          <p:cNvSpPr/>
+          <p:nvPr/>
+        </p:nvSpPr>
+        <p:spPr>
+          <a:xfrm>
+            <a:off x="6537960" y="4672583"/>
+            <a:ext cx="54864" cy="54864"/>
+          </a:xfrm>
+          <a:prstGeom prst="ellipse">
+            <a:avLst/>
+          </a:prstGeom>
+          <a:solidFill>
+            <a:srgbClr val="B5975B"/>
+          </a:solidFill>
+          <a:ln>
+            <a:noFill/>
+          </a:ln>
+        </p:spPr>
+        <p:style>
+          <a:lnRef idx="1">
+            <a:schemeClr val="accent1"/>
+          </a:lnRef>
+          <a:fillRef idx="3">
+            <a:schemeClr val="accent1"/>
+          </a:fillRef>
+          <a:effectRef idx="2">
+            <a:schemeClr val="accent1"/>
+          </a:effectRef>
+          <a:fontRef idx="minor">
+            <a:schemeClr val="lt1"/>
+          </a:fontRef>
+        </p:style>
+        <p:txBody>
+          <a:bodyPr rtlCol="0" anchor="ctr"/>
+          <a:lstStyle/>
+          <a:p>
+            <a:pPr algn="ctr"/>
+          </a:p>
+        </p:txBody>
+      </p:sp>
+      <p:sp>
+        <p:nvSpPr>
+          <p:cNvPr id="47" name="TextBox 46"/>
+          <p:cNvSpPr txBox="1"/>
+          <p:nvPr/>
+        </p:nvSpPr>
+        <p:spPr>
+          <a:xfrm>
+            <a:off x="6675120" y="4617719"/>
+            <a:ext cx="5029200" cy="201168"/>
+          </a:xfrm>
+          <a:prstGeom prst="rect">
+            <a:avLst/>
+          </a:prstGeom>
+          <a:noFill/>
+          <a:ln>
+            <a:noFill/>
+          </a:ln>
+          <a:effectLst/>
+        </p:spPr>
+        <p:txBody>
+          <a:bodyPr wrap="square" lIns="73152" rIns="73152"/>
+          <a:lstStyle/>
+          <a:p>
+            <a:pPr algn="l">
+              <a:lnSpc>
+                <a:spcPct val="110000"/>
+              </a:lnSpc>
+            </a:pPr>
+            <a:r>
+              <a:rPr sz="900" b="0">
+                <a:solidFill>
+                  <a:srgbClr val="404040"/>
+                </a:solidFill>
+                <a:latin typeface="Arial"/>
+              </a:rPr>
+              <a:t>Deep diligence: 4-5 weeks - Financials, IP, team interviews, security</a:t>
+            </a:r>
+          </a:p>
+        </p:txBody>
+      </p:sp>
+      <p:sp>
+        <p:nvSpPr>
+          <p:cNvPr id="48" name="Oval 47"/>
+          <p:cNvSpPr/>
+          <p:nvPr/>
+        </p:nvSpPr>
+        <p:spPr>
+          <a:xfrm>
+            <a:off x="6537960" y="4992622"/>
+            <a:ext cx="54864" cy="54864"/>
+          </a:xfrm>
+          <a:prstGeom prst="ellipse">
+            <a:avLst/>
+          </a:prstGeom>
+          <a:solidFill>
+            <a:srgbClr val="B5975B"/>
+          </a:solidFill>
+          <a:ln>
+            <a:noFill/>
+          </a:ln>
+        </p:spPr>
+        <p:style>
+          <a:lnRef idx="1">
+            <a:schemeClr val="accent1"/>
+          </a:lnRef>
+          <a:fillRef idx="3">
+            <a:schemeClr val="accent1"/>
+          </a:fillRef>
+          <a:effectRef idx="2">
+            <a:schemeClr val="accent1"/>
+          </a:effectRef>
+          <a:fontRef idx="minor">
+            <a:schemeClr val="lt1"/>
+          </a:fontRef>
+        </p:style>
+        <p:txBody>
+          <a:bodyPr rtlCol="0" anchor="ctr"/>
+          <a:lstStyle/>
+          <a:p>
+            <a:pPr algn="ctr"/>
+          </a:p>
+        </p:txBody>
+      </p:sp>
+      <p:sp>
+        <p:nvSpPr>
+          <p:cNvPr id="49" name="TextBox 48"/>
+          <p:cNvSpPr txBox="1"/>
+          <p:nvPr/>
+        </p:nvSpPr>
+        <p:spPr>
+          <a:xfrm>
+            <a:off x="6675120" y="4937758"/>
+            <a:ext cx="5029200" cy="201168"/>
+          </a:xfrm>
+          <a:prstGeom prst="rect">
+            <a:avLst/>
+          </a:prstGeom>
+          <a:noFill/>
+          <a:ln>
+            <a:noFill/>
+          </a:ln>
+          <a:effectLst/>
+        </p:spPr>
+        <p:txBody>
+          <a:bodyPr wrap="square" lIns="73152" rIns="73152"/>
+          <a:lstStyle/>
+          <a:p>
+            <a:pPr algn="l">
+              <a:lnSpc>
+                <a:spcPct val="110000"/>
+              </a:lnSpc>
+            </a:pPr>
+            <a:r>
+              <a:rPr sz="900" b="0">
+                <a:solidFill>
+                  <a:srgbClr val="404040"/>
+                </a:solidFill>
+                <a:latin typeface="Arial"/>
+              </a:rPr>
+              <a:t>Final offers: 2 weeks - Negotiation, board approvals</a:t>
+            </a:r>
+          </a:p>
+        </p:txBody>
+      </p:sp>
+      <p:sp>
+        <p:nvSpPr>
+          <p:cNvPr id="50" name="Oval 49"/>
+          <p:cNvSpPr/>
+          <p:nvPr/>
+        </p:nvSpPr>
+        <p:spPr>
+          <a:xfrm>
+            <a:off x="6537960" y="5312663"/>
+            <a:ext cx="54864" cy="54864"/>
+          </a:xfrm>
+          <a:prstGeom prst="ellipse">
+            <a:avLst/>
+          </a:prstGeom>
+          <a:solidFill>
+            <a:srgbClr val="B5975B"/>
+          </a:solidFill>
+          <a:ln>
+            <a:noFill/>
+          </a:ln>
+        </p:spPr>
+        <p:style>
+          <a:lnRef idx="1">
+            <a:schemeClr val="accent1"/>
+          </a:lnRef>
+          <a:fillRef idx="3">
+            <a:schemeClr val="accent1"/>
+          </a:fillRef>
+          <a:effectRef idx="2">
+            <a:schemeClr val="accent1"/>
+          </a:effectRef>
+          <a:fontRef idx="minor">
+            <a:schemeClr val="lt1"/>
+          </a:fontRef>
+        </p:style>
+        <p:txBody>
+          <a:bodyPr rtlCol="0" anchor="ctr"/>
+          <a:lstStyle/>
+          <a:p>
+            <a:pPr algn="ctr"/>
+          </a:p>
+        </p:txBody>
+      </p:sp>
+      <p:sp>
+        <p:nvSpPr>
+          <p:cNvPr id="51" name="TextBox 50"/>
+          <p:cNvSpPr txBox="1"/>
+          <p:nvPr/>
+        </p:nvSpPr>
+        <p:spPr>
+          <a:xfrm>
+            <a:off x="6675120" y="5257799"/>
+            <a:ext cx="5029200" cy="201168"/>
+          </a:xfrm>
+          <a:prstGeom prst="rect">
+            <a:avLst/>
+          </a:prstGeom>
+          <a:noFill/>
+          <a:ln>
+            <a:noFill/>
+          </a:ln>
+          <a:effectLst/>
+        </p:spPr>
+        <p:txBody>
+          <a:bodyPr wrap="square" lIns="73152" rIns="73152"/>
+          <a:lstStyle/>
+          <a:p>
+            <a:pPr algn="l">
+              <a:lnSpc>
+                <a:spcPct val="110000"/>
+              </a:lnSpc>
+            </a:pPr>
+            <a:r>
+              <a:rPr sz="900" b="0">
+                <a:solidFill>
+                  <a:srgbClr val="404040"/>
+                </a:solidFill>
+                <a:latin typeface="Arial"/>
+              </a:rPr>
+              <a:t>Signing/closing: 2-3 weeks - SPA/APA, regulatory, final close</a:t>
+            </a:r>
+          </a:p>
+        </p:txBody>
+      </p:sp>
+      <p:sp>
+        <p:nvSpPr>
+          <p:cNvPr id="52" name="TextBox 51"/>
+          <p:cNvSpPr txBox="1"/>
+          <p:nvPr/>
+        </p:nvSpPr>
+        <p:spPr>
+          <a:xfrm>
+            <a:off x="457200" y="6309360"/>
+            <a:ext cx="5486400" cy="365760"/>
+          </a:xfrm>
+          <a:prstGeom prst="rect">
+            <a:avLst/>
+          </a:prstGeom>
+          <a:noFill/>
+        </p:spPr>
+        <p:txBody>
+          <a:bodyPr wrap="none" anchor="ctr">
             <a:spAutoFit/>
           </a:bodyPr>
           <a:lstStyle/>
           <a:p>
-            <a:pPr algn="l"/>
-            <a:r>
-              <a:rPr sz="1400"/>
-              <a:t>Renderer error: 'str' object has no attribute 'get'</a:t>
+            <a:pPr algn="l">
+              <a:defRPr sz="900">
+                <a:solidFill>
+                  <a:srgbClr val="808080"/>
+                </a:solidFill>
+                <a:latin typeface="Arial"/>
+              </a:defRPr>
+            </a:pPr>
+            <a:r>
+              <a:t>Confidential | September 08, 2025</a:t>
+            </a:r>
+          </a:p>
+        </p:txBody>
+      </p:sp>
+      <p:sp>
+        <p:nvSpPr>
+          <p:cNvPr id="53" name="TextBox 52"/>
+          <p:cNvSpPr txBox="1"/>
+          <p:nvPr/>
+        </p:nvSpPr>
+        <p:spPr>
+          <a:xfrm>
+            <a:off x="9144000" y="6309360"/>
+            <a:ext cx="2743200" cy="365760"/>
+          </a:xfrm>
+          <a:prstGeom prst="rect">
+            <a:avLst/>
+          </a:prstGeom>
+          <a:noFill/>
+        </p:spPr>
+        <p:txBody>
+          <a:bodyPr wrap="none" anchor="ctr">
+            <a:spAutoFit/>
+          </a:bodyPr>
+          <a:lstStyle/>
+          <a:p>
+            <a:pPr algn="r">
+              <a:defRPr sz="900">
+                <a:solidFill>
+                  <a:srgbClr val="808080"/>
+                </a:solidFill>
+                <a:latin typeface="Arial"/>
+              </a:defRPr>
+            </a:pPr>
+            <a:r>
+              <a:t>Moelis &amp; Company</a:t>
             </a:r>
           </a:p>
         </p:txBody>
@@ -13181,7 +13266,7 @@
         </p:nvGraphicFramePr>
         <p:xfrm>
           <a:off x="6583680" y="1645920"/>
-          <a:ext cx="1828800" cy="2560320"/>
+          <a:ext cx="5029200" cy="2560320"/>
         </p:xfrm>
         <a:graphic>
           <a:graphicData uri="http://schemas.openxmlformats.org/drawingml/2006/table">
@@ -13190,10 +13275,12 @@
                 <a:tableStyleId>{5C22544A-7EE6-4342-B048-85BDC9FD1C3A}</a:tableStyleId>
               </a:tblPr>
               <a:tblGrid>
-                <a:gridCol w="1097280"/>
-                <a:gridCol w="731520"/>
+                <a:gridCol w="1737360"/>
+                <a:gridCol w="1280160"/>
+                <a:gridCol w="1005840"/>
+                <a:gridCol w="1005840"/>
               </a:tblGrid>
-              <a:tr h="853440">
+              <a:tr h="512064">
                 <a:tc>
                   <a:txBody>
                     <a:bodyPr/>
@@ -13230,7 +13317,53 @@
                           </a:solidFill>
                           <a:latin typeface="Arial"/>
                         </a:rPr>
-                        <a:t>Status</a:t>
+                        <a:t>Market Segment</a:t>
+                      </a:r>
+                    </a:p>
+                  </a:txBody>
+                  <a:tcPr marL="45720" marR="45720" marT="45720" marB="45720">
+                    <a:solidFill>
+                      <a:srgbClr val="183A58"/>
+                    </a:solidFill>
+                  </a:tcPr>
+                </a:tc>
+                <a:tc>
+                  <a:txBody>
+                    <a:bodyPr/>
+                    <a:lstStyle/>
+                    <a:p>
+                      <a:pPr algn="ctr"/>
+                      <a:r>
+                        <a:rPr sz="900" b="1">
+                          <a:solidFill>
+                            <a:srgbClr val="FFFFFF"/>
+                          </a:solidFill>
+                          <a:latin typeface="Arial"/>
+                        </a:rPr>
+                        <a:t>Major Assets/Products</a:t>
+                      </a:r>
+                    </a:p>
+                  </a:txBody>
+                  <a:tcPr marL="45720" marR="45720" marT="45720" marB="45720">
+                    <a:solidFill>
+                      <a:srgbClr val="183A58"/>
+                    </a:solidFill>
+                  </a:tcPr>
+                </a:tc>
+                <a:tc>
+                  <a:txBody>
+                    <a:bodyPr/>
+                    <a:lstStyle/>
+                    <a:p>
+                      <a:pPr algn="ctr"/>
+                      <a:r>
+                        <a:rPr sz="900" b="1">
+                          <a:solidFill>
+                            <a:srgbClr val="FFFFFF"/>
+                          </a:solidFill>
+                          <a:latin typeface="Arial"/>
+                        </a:rPr>
+                        <a:t>Coverage Details</a:t>
                       </a:r>
                     </a:p>
                   </a:txBody>
@@ -13241,7 +13374,7 @@
                   </a:tcPr>
                 </a:tc>
               </a:tr>
-              <a:tr h="853440">
+              <a:tr h="512064">
                 <a:tc>
                   <a:txBody>
                     <a:bodyPr/>
@@ -13255,7 +13388,7 @@
                           </a:solidFill>
                           <a:latin typeface="Arial"/>
                         </a:rPr>
-                        <a:t>No data</a:t>
+                        <a:t>United States</a:t>
                       </a:r>
                     </a:p>
                   </a:txBody>
@@ -13278,7 +13411,7 @@
                           </a:solidFill>
                           <a:latin typeface="Arial"/>
                         </a:rPr>
-                        <a:t>Please provide</a:t>
+                        <a:t>Finance, Tech, Services</a:t>
                       </a:r>
                     </a:p>
                   </a:txBody>
@@ -13288,8 +13421,6 @@
                     </a:solidFill>
                   </a:tcPr>
                 </a:tc>
-              </a:tr>
-              <a:tr h="853440">
                 <a:tc>
                   <a:txBody>
                     <a:bodyPr/>
@@ -13303,7 +13434,55 @@
                           </a:solidFill>
                           <a:latin typeface="Arial"/>
                         </a:rPr>
-                        <a:t>coverage_table</a:t>
+                        <a:t>LlamaCloud, LlamaParse, Framework</a:t>
+                      </a:r>
+                    </a:p>
+                  </a:txBody>
+                  <a:tcPr marL="45720" marR="45720" marT="45720" marB="45720">
+                    <a:solidFill>
+                      <a:srgbClr val="FFFFFF"/>
+                    </a:solidFill>
+                  </a:tcPr>
+                </a:tc>
+                <a:tc>
+                  <a:txBody>
+                    <a:bodyPr/>
+                    <a:lstStyle/>
+                    <a:p>
+                      <a:pPr algn="ctr"/>
+                      <a:r>
+                        <a:rPr sz="900">
+                          <a:solidFill>
+                            <a:srgbClr val="404040"/>
+                          </a:solidFill>
+                          <a:latin typeface="Arial"/>
+                        </a:rPr>
+                        <a:t>Enterprise deployments, Fortune 500 clients</a:t>
+                      </a:r>
+                    </a:p>
+                  </a:txBody>
+                  <a:tcPr marL="45720" marR="45720" marT="45720" marB="45720">
+                    <a:solidFill>
+                      <a:srgbClr val="FFFFFF"/>
+                    </a:solidFill>
+                  </a:tcPr>
+                </a:tc>
+              </a:tr>
+              <a:tr h="512064">
+                <a:tc>
+                  <a:txBody>
+                    <a:bodyPr/>
+                    <a:lstStyle/>
+                    <a:p>
+                      <a:pPr algn="ctr"/>
+                      <a:r>
+                        <a:rPr sz="900">
+                          <a:solidFill>
+                            <a:srgbClr val="404040"/>
+                          </a:solidFill>
+                          <a:latin typeface="Arial"/>
+                        </a:rPr>
+                        <a:t>Europe</a:t>
                       </a:r>
                     </a:p>
                   </a:txBody>
@@ -13326,7 +13505,241 @@
                           </a:solidFill>
                           <a:latin typeface="Arial"/>
                         </a:rPr>
-                        <a:t>in JSON data</a:t>
+                        <a:t>Consulting, Manufacturing</a:t>
+                      </a:r>
+                    </a:p>
+                  </a:txBody>
+                  <a:tcPr marL="45720" marR="45720" marT="45720" marB="45720">
+                    <a:solidFill>
+                      <a:srgbClr val="F0F0F0"/>
+                    </a:solidFill>
+                  </a:tcPr>
+                </a:tc>
+                <a:tc>
+                  <a:txBody>
+                    <a:bodyPr/>
+                    <a:lstStyle/>
+                    <a:p>
+                      <a:pPr algn="ctr"/>
+                      <a:r>
+                        <a:rPr sz="900">
+                          <a:solidFill>
+                            <a:srgbClr val="404040"/>
+                          </a:solidFill>
+                          <a:latin typeface="Arial"/>
+                        </a:rPr>
+                        <a:t>LlamaCloud, LlamaParse, Connectors</a:t>
+                      </a:r>
+                    </a:p>
+                  </a:txBody>
+                  <a:tcPr marL="45720" marR="45720" marT="45720" marB="45720">
+                    <a:solidFill>
+                      <a:srgbClr val="F0F0F0"/>
+                    </a:solidFill>
+                  </a:tcPr>
+                </a:tc>
+                <a:tc>
+                  <a:txBody>
+                    <a:bodyPr/>
+                    <a:lstStyle/>
+                    <a:p>
+                      <a:pPr algn="ctr"/>
+                      <a:r>
+                        <a:rPr sz="900">
+                          <a:solidFill>
+                            <a:srgbClr val="404040"/>
+                          </a:solidFill>
+                          <a:latin typeface="Arial"/>
+                        </a:rPr>
+                        <a:t>KPMG, industry leaders, RAG and AI workflow standardization</a:t>
+                      </a:r>
+                    </a:p>
+                  </a:txBody>
+                  <a:tcPr marL="45720" marR="45720" marT="45720" marB="45720">
+                    <a:solidFill>
+                      <a:srgbClr val="F0F0F0"/>
+                    </a:solidFill>
+                  </a:tcPr>
+                </a:tc>
+              </a:tr>
+              <a:tr h="512064">
+                <a:tc>
+                  <a:txBody>
+                    <a:bodyPr/>
+                    <a:lstStyle/>
+                    <a:p>
+                      <a:pPr algn="ctr"/>
+                      <a:r>
+                        <a:rPr sz="900">
+                          <a:solidFill>
+                            <a:srgbClr val="404040"/>
+                          </a:solidFill>
+                          <a:latin typeface="Arial"/>
+                        </a:rPr>
+                        <a:t>Asia</a:t>
+                      </a:r>
+                    </a:p>
+                  </a:txBody>
+                  <a:tcPr marL="45720" marR="45720" marT="45720" marB="45720">
+                    <a:solidFill>
+                      <a:srgbClr val="FFFFFF"/>
+                    </a:solidFill>
+                  </a:tcPr>
+                </a:tc>
+                <a:tc>
+                  <a:txBody>
+                    <a:bodyPr/>
+                    <a:lstStyle/>
+                    <a:p>
+                      <a:pPr algn="ctr"/>
+                      <a:r>
+                        <a:rPr sz="900">
+                          <a:solidFill>
+                            <a:srgbClr val="404040"/>
+                          </a:solidFill>
+                          <a:latin typeface="Arial"/>
+                        </a:rPr>
+                        <a:t>Tech, Financial Services</a:t>
+                      </a:r>
+                    </a:p>
+                  </a:txBody>
+                  <a:tcPr marL="45720" marR="45720" marT="45720" marB="45720">
+                    <a:solidFill>
+                      <a:srgbClr val="FFFFFF"/>
+                    </a:solidFill>
+                  </a:tcPr>
+                </a:tc>
+                <a:tc>
+                  <a:txBody>
+                    <a:bodyPr/>
+                    <a:lstStyle/>
+                    <a:p>
+                      <a:pPr algn="ctr"/>
+                      <a:r>
+                        <a:rPr sz="900">
+                          <a:solidFill>
+                            <a:srgbClr val="404040"/>
+                          </a:solidFill>
+                          <a:latin typeface="Arial"/>
+                        </a:rPr>
+                        <a:t>LlamaCloud, Framework, Data Connectors</a:t>
+                      </a:r>
+                    </a:p>
+                  </a:txBody>
+                  <a:tcPr marL="45720" marR="45720" marT="45720" marB="45720">
+                    <a:solidFill>
+                      <a:srgbClr val="FFFFFF"/>
+                    </a:solidFill>
+                  </a:tcPr>
+                </a:tc>
+                <a:tc>
+                  <a:txBody>
+                    <a:bodyPr/>
+                    <a:lstStyle/>
+                    <a:p>
+                      <a:pPr algn="ctr"/>
+                      <a:r>
+                        <a:rPr sz="900">
+                          <a:solidFill>
+                            <a:srgbClr val="404040"/>
+                          </a:solidFill>
+                          <a:latin typeface="Arial"/>
+                        </a:rPr>
+                        <a:t>Adoption in India, Singapore, Japan; growing in SE Asia</a:t>
+                      </a:r>
+                    </a:p>
+                  </a:txBody>
+                  <a:tcPr marL="45720" marR="45720" marT="45720" marB="45720">
+                    <a:solidFill>
+                      <a:srgbClr val="FFFFFF"/>
+                    </a:solidFill>
+                  </a:tcPr>
+                </a:tc>
+              </a:tr>
+              <a:tr h="512064">
+                <a:tc>
+                  <a:txBody>
+                    <a:bodyPr/>
+                    <a:lstStyle/>
+                    <a:p>
+                      <a:pPr algn="ctr"/>
+                      <a:r>
+                        <a:rPr sz="900">
+                          <a:solidFill>
+                            <a:srgbClr val="404040"/>
+                          </a:solidFill>
+                          <a:latin typeface="Arial"/>
+                        </a:rPr>
+                        <a:t>Global</a:t>
+                      </a:r>
+                    </a:p>
+                  </a:txBody>
+                  <a:tcPr marL="45720" marR="45720" marT="45720" marB="45720">
+                    <a:solidFill>
+                      <a:srgbClr val="F0F0F0"/>
+                    </a:solidFill>
+                  </a:tcPr>
+                </a:tc>
+                <a:tc>
+                  <a:txBody>
+                    <a:bodyPr/>
+                    <a:lstStyle/>
+                    <a:p>
+                      <a:pPr algn="ctr"/>
+                      <a:r>
+                        <a:rPr sz="900">
+                          <a:solidFill>
+                            <a:srgbClr val="404040"/>
+                          </a:solidFill>
+                          <a:latin typeface="Arial"/>
+                        </a:rPr>
+                        <a:t>Open Source/Dev Community</a:t>
+                      </a:r>
+                    </a:p>
+                  </a:txBody>
+                  <a:tcPr marL="45720" marR="45720" marT="45720" marB="45720">
+                    <a:solidFill>
+                      <a:srgbClr val="F0F0F0"/>
+                    </a:solidFill>
+                  </a:tcPr>
+                </a:tc>
+                <a:tc>
+                  <a:txBody>
+                    <a:bodyPr/>
+                    <a:lstStyle/>
+                    <a:p>
+                      <a:pPr algn="ctr"/>
+                      <a:r>
+                        <a:rPr sz="900">
+                          <a:solidFill>
+                            <a:srgbClr val="404040"/>
+                          </a:solidFill>
+                          <a:latin typeface="Arial"/>
+                        </a:rPr>
+                        <a:t>LlamaIndex Framework, LlamaHub</a:t>
+                      </a:r>
+                    </a:p>
+                  </a:txBody>
+                  <a:tcPr marL="45720" marR="45720" marT="45720" marB="45720">
+                    <a:solidFill>
+                      <a:srgbClr val="F0F0F0"/>
+                    </a:solidFill>
+                  </a:tcPr>
+                </a:tc>
+                <a:tc>
+                  <a:txBody>
+                    <a:bodyPr/>
+                    <a:lstStyle/>
+                    <a:p>
+                      <a:pPr algn="ctr"/>
+                      <a:r>
+                        <a:rPr sz="900">
+                          <a:solidFill>
+                            <a:srgbClr val="404040"/>
+                          </a:solidFill>
+                          <a:latin typeface="Arial"/>
+                        </a:rPr>
+                        <a:t>3M+ monthly downloads, developer adoption worldwide</a:t>
                       </a:r>
                     </a:p>
                   </a:txBody>
@@ -14085,7 +14498,7 @@
                 </a:solidFill>
                 <a:latin typeface="Arial"/>
               </a:rPr>
-              <a:t>Key Metric 1</a:t>
+              <a:t>Revenue CAGR</a:t>
             </a:r>
           </a:p>
         </p:txBody>
@@ -14163,7 +14576,7 @@
                 </a:solidFill>
                 <a:latin typeface="Arial"/>
               </a:rPr>
-              <a:t>(Historical)</a:t>
+              <a:t>(2020-2024E)</a:t>
             </a:r>
           </a:p>
         </p:txBody>
@@ -14195,6 +14608,15 @@
           <a:lstStyle/>
           <a:p>
             <a:pPr algn="l"/>
+            <a:r>
+              <a:rPr sz="800" b="0">
+                <a:solidFill>
+                  <a:srgbClr val="228B22"/>
+                </a:solidFill>
+                <a:latin typeface="Arial"/>
+              </a:rPr>
+              <a:t>High growth trajectory</a:t>
+            </a:r>
           </a:p>
         </p:txBody>
       </p:sp>
@@ -14276,7 +14698,7 @@
                 </a:solidFill>
                 <a:latin typeface="Arial"/>
               </a:rPr>
-              <a:t>Key Metric 2</a:t>
+              <a:t>2024E Revenue</a:t>
             </a:r>
           </a:p>
         </p:txBody>
@@ -14315,7 +14737,7 @@
                 </a:solidFill>
                 <a:latin typeface="Arial"/>
               </a:rPr>
-              <a:t>38.0</a:t>
+              <a:t>$38.0M</a:t>
             </a:r>
           </a:p>
         </p:txBody>
@@ -14354,7 +14776,7 @@
                 </a:solidFill>
                 <a:latin typeface="Arial"/>
               </a:rPr>
-              <a:t>(Historical)</a:t>
+              <a:t>USD (Est.)</a:t>
             </a:r>
           </a:p>
         </p:txBody>
@@ -14386,6 +14808,15 @@
           <a:lstStyle/>
           <a:p>
             <a:pPr algn="l"/>
+            <a:r>
+              <a:rPr sz="800" b="0">
+                <a:solidFill>
+                  <a:srgbClr val="228B22"/>
+                </a:solidFill>
+                <a:latin typeface="Arial"/>
+              </a:rPr>
+              <a:t>Strong scaling momentum</a:t>
+            </a:r>
           </a:p>
         </p:txBody>
       </p:sp>
@@ -14467,7 +14898,7 @@
                 </a:solidFill>
                 <a:latin typeface="Arial"/>
               </a:rPr>
-              <a:t>Key Metric 3</a:t>
+              <a:t>2024E EBITDA</a:t>
             </a:r>
           </a:p>
         </p:txBody>
@@ -14506,7 +14937,7 @@
                 </a:solidFill>
                 <a:latin typeface="Arial"/>
               </a:rPr>
-              <a:t>5.7</a:t>
+              <a:t>$5.7M</a:t>
             </a:r>
           </a:p>
         </p:txBody>
@@ -14545,7 +14976,7 @@
                 </a:solidFill>
                 <a:latin typeface="Arial"/>
               </a:rPr>
-              <a:t>(Historical)</a:t>
+              <a:t>USD (Est.)</a:t>
             </a:r>
           </a:p>
         </p:txBody>
@@ -14577,6 +15008,15 @@
           <a:lstStyle/>
           <a:p>
             <a:pPr algn="l"/>
+            <a:r>
+              <a:rPr sz="800" b="0">
+                <a:solidFill>
+                  <a:srgbClr val="228B22"/>
+                </a:solidFill>
+                <a:latin typeface="Arial"/>
+              </a:rPr>
+              <a:t>Achieving profitability</a:t>
+            </a:r>
           </a:p>
         </p:txBody>
       </p:sp>
@@ -14658,7 +15098,7 @@
                 </a:solidFill>
                 <a:latin typeface="Arial"/>
               </a:rPr>
-              <a:t>Key Metric 4</a:t>
+              <a:t>Enterprise Clients</a:t>
             </a:r>
           </a:p>
         </p:txBody>
@@ -14697,7 +15137,7 @@
                 </a:solidFill>
                 <a:latin typeface="Arial"/>
               </a:rPr>
-              <a:t>300</a:t>
+              <a:t>300+</a:t>
             </a:r>
           </a:p>
         </p:txBody>
@@ -14736,7 +15176,7 @@
                 </a:solidFill>
                 <a:latin typeface="Arial"/>
               </a:rPr>
-              <a:t>(Historical)</a:t>
+              <a:t>(Current)</a:t>
             </a:r>
           </a:p>
         </p:txBody>
@@ -14768,6 +15208,15 @@
           <a:lstStyle/>
           <a:p>
             <a:pPr algn="l"/>
+            <a:r>
+              <a:rPr sz="800" b="0">
+                <a:solidFill>
+                  <a:srgbClr val="228B22"/>
+                </a:solidFill>
+                <a:latin typeface="Arial"/>
+              </a:rPr>
+              <a:t>Fortune 500 adoption</a:t>
+            </a:r>
           </a:p>
         </p:txBody>
       </p:sp>
@@ -15231,8 +15680,8 @@
         </p:nvSpPr>
         <p:spPr>
           <a:xfrm>
-            <a:off x="274320" y="1325880"/>
-            <a:ext cx="3657600" cy="320040"/>
+            <a:off x="700887" y="1325880"/>
+            <a:ext cx="5029200" cy="320040"/>
           </a:xfrm>
           <a:prstGeom prst="rect">
             <a:avLst/>
@@ -15254,6 +15703,10 @@
               </a:defRPr>
             </a:pPr>
             <a:r>
+              <a:t>Jerry Liu</a:t>
+            </a:r>
+            <a:br/>
+            <a:r>
               <a:t>Chief Executive Officer (CEO)</a:t>
             </a:r>
           </a:p>
@@ -15267,8 +15720,8 @@
         </p:nvSpPr>
         <p:spPr>
           <a:xfrm>
-            <a:off x="274320" y="1691640"/>
-            <a:ext cx="3657600" cy="493776"/>
+            <a:off x="700887" y="1691640"/>
+            <a:ext cx="5029200" cy="329184"/>
           </a:xfrm>
           <a:prstGeom prst="rect">
             <a:avLst/>
@@ -15304,8 +15757,8 @@
         </p:nvSpPr>
         <p:spPr>
           <a:xfrm>
-            <a:off x="274320" y="2240280"/>
-            <a:ext cx="3657600" cy="329184"/>
+            <a:off x="700887" y="2075688"/>
+            <a:ext cx="5029200" cy="329184"/>
           </a:xfrm>
           <a:prstGeom prst="rect">
             <a:avLst/>
@@ -15341,8 +15794,8 @@
         </p:nvSpPr>
         <p:spPr>
           <a:xfrm>
-            <a:off x="274320" y="2624328"/>
-            <a:ext cx="3657600" cy="329184"/>
+            <a:off x="700887" y="2459736"/>
+            <a:ext cx="5029200" cy="329184"/>
           </a:xfrm>
           <a:prstGeom prst="rect">
             <a:avLst/>
@@ -15378,8 +15831,8 @@
         </p:nvSpPr>
         <p:spPr>
           <a:xfrm>
-            <a:off x="274320" y="3008376"/>
-            <a:ext cx="3657600" cy="329184"/>
+            <a:off x="700887" y="2843784"/>
+            <a:ext cx="5029200" cy="329184"/>
           </a:xfrm>
           <a:prstGeom prst="rect">
             <a:avLst/>
@@ -15415,8 +15868,8 @@
         </p:nvSpPr>
         <p:spPr>
           <a:xfrm>
-            <a:off x="274320" y="3392424"/>
-            <a:ext cx="3657600" cy="329184"/>
+            <a:off x="700887" y="3227832"/>
+            <a:ext cx="5029200" cy="329184"/>
           </a:xfrm>
           <a:prstGeom prst="rect">
             <a:avLst/>
@@ -15452,8 +15905,8 @@
         </p:nvSpPr>
         <p:spPr>
           <a:xfrm>
-            <a:off x="274320" y="3867912"/>
-            <a:ext cx="3657600" cy="320040"/>
+            <a:off x="700887" y="3703320"/>
+            <a:ext cx="5029200" cy="320040"/>
           </a:xfrm>
           <a:prstGeom prst="rect">
             <a:avLst/>
@@ -15475,6 +15928,10 @@
               </a:defRPr>
             </a:pPr>
             <a:r>
+              <a:t>Simon Suo</a:t>
+            </a:r>
+            <a:br/>
+            <a:r>
               <a:t>Chief Technology Officer (CTO)</a:t>
             </a:r>
           </a:p>
@@ -15488,8 +15945,8 @@
         </p:nvSpPr>
         <p:spPr>
           <a:xfrm>
-            <a:off x="274320" y="4233672"/>
-            <a:ext cx="3657600" cy="329184"/>
+            <a:off x="700887" y="4069080"/>
+            <a:ext cx="5029200" cy="329184"/>
           </a:xfrm>
           <a:prstGeom prst="rect">
             <a:avLst/>
@@ -15525,8 +15982,8 @@
         </p:nvSpPr>
         <p:spPr>
           <a:xfrm>
-            <a:off x="274320" y="4617720"/>
-            <a:ext cx="3657600" cy="329184"/>
+            <a:off x="700887" y="4453128"/>
+            <a:ext cx="5029200" cy="329184"/>
           </a:xfrm>
           <a:prstGeom prst="rect">
             <a:avLst/>
@@ -15562,8 +16019,8 @@
         </p:nvSpPr>
         <p:spPr>
           <a:xfrm>
-            <a:off x="274320" y="5001768"/>
-            <a:ext cx="3657600" cy="329184"/>
+            <a:off x="700887" y="4837176"/>
+            <a:ext cx="5029200" cy="329184"/>
           </a:xfrm>
           <a:prstGeom prst="rect">
             <a:avLst/>
@@ -15599,8 +16056,8 @@
         </p:nvSpPr>
         <p:spPr>
           <a:xfrm>
-            <a:off x="274320" y="5385816"/>
-            <a:ext cx="3657600" cy="329184"/>
+            <a:off x="700887" y="5221224"/>
+            <a:ext cx="5029200" cy="329184"/>
           </a:xfrm>
           <a:prstGeom prst="rect">
             <a:avLst/>
@@ -15636,8 +16093,8 @@
         </p:nvSpPr>
         <p:spPr>
           <a:xfrm>
-            <a:off x="274320" y="5769864"/>
-            <a:ext cx="3657600" cy="329184"/>
+            <a:off x="700887" y="5605272"/>
+            <a:ext cx="5029200" cy="329184"/>
           </a:xfrm>
           <a:prstGeom prst="rect">
             <a:avLst/>
@@ -15673,8 +16130,8 @@
         </p:nvSpPr>
         <p:spPr>
           <a:xfrm>
-            <a:off x="4069080" y="1325880"/>
-            <a:ext cx="3657600" cy="320040"/>
+            <a:off x="6461607" y="1325880"/>
+            <a:ext cx="5029200" cy="320040"/>
           </a:xfrm>
           <a:prstGeom prst="rect">
             <a:avLst/>
@@ -15696,6 +16153,10 @@
               </a:defRPr>
             </a:pPr>
             <a:r>
+              <a:t>Andrei Fajardo</a:t>
+            </a:r>
+            <a:br/>
+            <a:r>
               <a:t>Founding Account Executive</a:t>
             </a:r>
           </a:p>
@@ -15709,8 +16170,8 @@
         </p:nvSpPr>
         <p:spPr>
           <a:xfrm>
-            <a:off x="4069080" y="1691640"/>
-            <a:ext cx="3657600" cy="493776"/>
+            <a:off x="6461607" y="1691640"/>
+            <a:ext cx="5029200" cy="329184"/>
           </a:xfrm>
           <a:prstGeom prst="rect">
             <a:avLst/>
@@ -15746,8 +16207,8 @@
         </p:nvSpPr>
         <p:spPr>
           <a:xfrm>
-            <a:off x="4069080" y="2240280"/>
-            <a:ext cx="3657600" cy="493776"/>
+            <a:off x="6461607" y="2075688"/>
+            <a:ext cx="5029200" cy="329184"/>
           </a:xfrm>
           <a:prstGeom prst="rect">
             <a:avLst/>
@@ -15783,8 +16244,8 @@
         </p:nvSpPr>
         <p:spPr>
           <a:xfrm>
-            <a:off x="4069080" y="2788920"/>
-            <a:ext cx="3657600" cy="329184"/>
+            <a:off x="6461607" y="2459736"/>
+            <a:ext cx="5029200" cy="329184"/>
           </a:xfrm>
           <a:prstGeom prst="rect">
             <a:avLst/>
@@ -15820,8 +16281,8 @@
         </p:nvSpPr>
         <p:spPr>
           <a:xfrm>
-            <a:off x="4069080" y="3172968"/>
-            <a:ext cx="3657600" cy="329184"/>
+            <a:off x="6461607" y="2843784"/>
+            <a:ext cx="5029200" cy="329184"/>
           </a:xfrm>
           <a:prstGeom prst="rect">
             <a:avLst/>
@@ -15857,8 +16318,8 @@
         </p:nvSpPr>
         <p:spPr>
           <a:xfrm>
-            <a:off x="4069080" y="3557016"/>
-            <a:ext cx="3657600" cy="329184"/>
+            <a:off x="6461607" y="3227832"/>
+            <a:ext cx="5029200" cy="329184"/>
           </a:xfrm>
           <a:prstGeom prst="rect">
             <a:avLst/>
@@ -15894,8 +16355,8 @@
         </p:nvSpPr>
         <p:spPr>
           <a:xfrm>
-            <a:off x="4069080" y="4032504"/>
-            <a:ext cx="3657600" cy="320040"/>
+            <a:off x="6461607" y="3703320"/>
+            <a:ext cx="5029200" cy="320040"/>
           </a:xfrm>
           <a:prstGeom prst="rect">
             <a:avLst/>
@@ -15917,6 +16378,10 @@
               </a:defRPr>
             </a:pPr>
             <a:r>
+              <a:t>Logan Markewich</a:t>
+            </a:r>
+            <a:br/>
+            <a:r>
               <a:t>Founding AI Engineer, Customer Facing</a:t>
             </a:r>
           </a:p>
@@ -15930,8 +16395,8 @@
         </p:nvSpPr>
         <p:spPr>
           <a:xfrm>
-            <a:off x="4069080" y="4398264"/>
-            <a:ext cx="3657600" cy="329184"/>
+            <a:off x="6461607" y="4069080"/>
+            <a:ext cx="5029200" cy="329184"/>
           </a:xfrm>
           <a:prstGeom prst="rect">
             <a:avLst/>
@@ -15967,8 +16432,8 @@
         </p:nvSpPr>
         <p:spPr>
           <a:xfrm>
-            <a:off x="4069080" y="4782312"/>
-            <a:ext cx="3657600" cy="329184"/>
+            <a:off x="6461607" y="4453128"/>
+            <a:ext cx="5029200" cy="329184"/>
           </a:xfrm>
           <a:prstGeom prst="rect">
             <a:avLst/>
@@ -16004,8 +16469,8 @@
         </p:nvSpPr>
         <p:spPr>
           <a:xfrm>
-            <a:off x="4069080" y="5166360"/>
-            <a:ext cx="3657600" cy="329184"/>
+            <a:off x="6461607" y="4837176"/>
+            <a:ext cx="5029200" cy="329184"/>
           </a:xfrm>
           <a:prstGeom prst="rect">
             <a:avLst/>
@@ -16041,8 +16506,8 @@
         </p:nvSpPr>
         <p:spPr>
           <a:xfrm>
-            <a:off x="4069080" y="5550408"/>
-            <a:ext cx="3657600" cy="329184"/>
+            <a:off x="6461607" y="5221224"/>
+            <a:ext cx="5029200" cy="329184"/>
           </a:xfrm>
           <a:prstGeom prst="rect">
             <a:avLst/>
@@ -16078,8 +16543,8 @@
         </p:nvSpPr>
         <p:spPr>
           <a:xfrm>
-            <a:off x="4069080" y="5934456"/>
-            <a:ext cx="3657600" cy="329184"/>
+            <a:off x="6461607" y="5605272"/>
+            <a:ext cx="5029200" cy="329184"/>
           </a:xfrm>
           <a:prstGeom prst="rect">
             <a:avLst/>
@@ -19775,6 +20240,1713 @@
           </a:p>
         </p:txBody>
       </p:sp>
+      <p:sp>
+        <p:nvSpPr>
+          <p:cNvPr id="5" name="Rectangle 4"/>
+          <p:cNvSpPr/>
+          <p:nvPr/>
+        </p:nvSpPr>
+        <p:spPr>
+          <a:xfrm>
+            <a:off x="1645920" y="-17099280"/>
+            <a:ext cx="1645920" cy="20574000"/>
+          </a:xfrm>
+          <a:prstGeom prst="rect">
+            <a:avLst/>
+          </a:prstGeom>
+          <a:solidFill>
+            <a:srgbClr val="183A58"/>
+          </a:solidFill>
+          <a:ln>
+            <a:noFill/>
+          </a:ln>
+        </p:spPr>
+        <p:style>
+          <a:lnRef idx="1">
+            <a:schemeClr val="accent1"/>
+          </a:lnRef>
+          <a:fillRef idx="3">
+            <a:schemeClr val="accent1"/>
+          </a:fillRef>
+          <a:effectRef idx="2">
+            <a:schemeClr val="accent1"/>
+          </a:effectRef>
+          <a:fontRef idx="minor">
+            <a:schemeClr val="lt1"/>
+          </a:fontRef>
+        </p:style>
+        <p:txBody>
+          <a:bodyPr rtlCol="0" anchor="ctr"/>
+          <a:lstStyle/>
+          <a:p>
+            <a:pPr algn="ctr"/>
+          </a:p>
+        </p:txBody>
+      </p:sp>
+      <p:sp>
+        <p:nvSpPr>
+          <p:cNvPr id="6" name="TextBox 5"/>
+          <p:cNvSpPr txBox="1"/>
+          <p:nvPr/>
+        </p:nvSpPr>
+        <p:spPr>
+          <a:xfrm>
+            <a:off x="1645920" y="-17327880"/>
+            <a:ext cx="1645920" cy="182880"/>
+          </a:xfrm>
+          <a:prstGeom prst="rect">
+            <a:avLst/>
+          </a:prstGeom>
+          <a:noFill/>
+        </p:spPr>
+        <p:txBody>
+          <a:bodyPr wrap="none">
+            <a:spAutoFit/>
+          </a:bodyPr>
+          <a:lstStyle/>
+          <a:p>
+            <a:pPr algn="ctr">
+              <a:defRPr sz="900" b="1">
+                <a:latin typeface="Arial"/>
+              </a:defRPr>
+            </a:pPr>
+            <a:r>
+              <a:t>50.0x</a:t>
+            </a:r>
+          </a:p>
+        </p:txBody>
+      </p:sp>
+      <p:sp>
+        <p:nvSpPr>
+          <p:cNvPr id="7" name="TextBox 6"/>
+          <p:cNvSpPr txBox="1"/>
+          <p:nvPr/>
+        </p:nvSpPr>
+        <p:spPr>
+          <a:xfrm>
+            <a:off x="1645920" y="3566160"/>
+            <a:ext cx="1645920" cy="182880"/>
+          </a:xfrm>
+          <a:prstGeom prst="rect">
+            <a:avLst/>
+          </a:prstGeom>
+          <a:noFill/>
+        </p:spPr>
+        <p:txBody>
+          <a:bodyPr wrap="none">
+            <a:spAutoFit/>
+          </a:bodyPr>
+          <a:lstStyle/>
+          <a:p>
+            <a:pPr algn="ctr">
+              <a:defRPr sz="900">
+                <a:latin typeface="Arial"/>
+              </a:defRPr>
+            </a:pPr>
+            <a:r>
+              <a:t>T1</a:t>
+            </a:r>
+          </a:p>
+        </p:txBody>
+      </p:sp>
+      <p:sp>
+        <p:nvSpPr>
+          <p:cNvPr id="8" name="Rectangle 7"/>
+          <p:cNvSpPr/>
+          <p:nvPr/>
+        </p:nvSpPr>
+        <p:spPr>
+          <a:xfrm>
+            <a:off x="3383280" y="-9281160"/>
+            <a:ext cx="1645920" cy="12755880"/>
+          </a:xfrm>
+          <a:prstGeom prst="rect">
+            <a:avLst/>
+          </a:prstGeom>
+          <a:solidFill>
+            <a:srgbClr val="183A58"/>
+          </a:solidFill>
+          <a:ln>
+            <a:noFill/>
+          </a:ln>
+        </p:spPr>
+        <p:style>
+          <a:lnRef idx="1">
+            <a:schemeClr val="accent1"/>
+          </a:lnRef>
+          <a:fillRef idx="3">
+            <a:schemeClr val="accent1"/>
+          </a:fillRef>
+          <a:effectRef idx="2">
+            <a:schemeClr val="accent1"/>
+          </a:effectRef>
+          <a:fontRef idx="minor">
+            <a:schemeClr val="lt1"/>
+          </a:fontRef>
+        </p:style>
+        <p:txBody>
+          <a:bodyPr rtlCol="0" anchor="ctr"/>
+          <a:lstStyle/>
+          <a:p>
+            <a:pPr algn="ctr"/>
+          </a:p>
+        </p:txBody>
+      </p:sp>
+      <p:sp>
+        <p:nvSpPr>
+          <p:cNvPr id="9" name="TextBox 8"/>
+          <p:cNvSpPr txBox="1"/>
+          <p:nvPr/>
+        </p:nvSpPr>
+        <p:spPr>
+          <a:xfrm>
+            <a:off x="3383280" y="-9509760"/>
+            <a:ext cx="1645920" cy="182880"/>
+          </a:xfrm>
+          <a:prstGeom prst="rect">
+            <a:avLst/>
+          </a:prstGeom>
+          <a:noFill/>
+        </p:spPr>
+        <p:txBody>
+          <a:bodyPr wrap="none">
+            <a:spAutoFit/>
+          </a:bodyPr>
+          <a:lstStyle/>
+          <a:p>
+            <a:pPr algn="ctr">
+              <a:defRPr sz="900" b="1">
+                <a:latin typeface="Arial"/>
+              </a:defRPr>
+            </a:pPr>
+            <a:r>
+              <a:t>31.0x</a:t>
+            </a:r>
+          </a:p>
+        </p:txBody>
+      </p:sp>
+      <p:sp>
+        <p:nvSpPr>
+          <p:cNvPr id="10" name="TextBox 9"/>
+          <p:cNvSpPr txBox="1"/>
+          <p:nvPr/>
+        </p:nvSpPr>
+        <p:spPr>
+          <a:xfrm>
+            <a:off x="3383280" y="3566160"/>
+            <a:ext cx="1645920" cy="182880"/>
+          </a:xfrm>
+          <a:prstGeom prst="rect">
+            <a:avLst/>
+          </a:prstGeom>
+          <a:noFill/>
+        </p:spPr>
+        <p:txBody>
+          <a:bodyPr wrap="none">
+            <a:spAutoFit/>
+          </a:bodyPr>
+          <a:lstStyle/>
+          <a:p>
+            <a:pPr algn="ctr">
+              <a:defRPr sz="900">
+                <a:latin typeface="Arial"/>
+              </a:defRPr>
+            </a:pPr>
+            <a:r>
+              <a:t>T2</a:t>
+            </a:r>
+          </a:p>
+        </p:txBody>
+      </p:sp>
+      <p:sp>
+        <p:nvSpPr>
+          <p:cNvPr id="11" name="Rectangle 10"/>
+          <p:cNvSpPr/>
+          <p:nvPr/>
+        </p:nvSpPr>
+        <p:spPr>
+          <a:xfrm>
+            <a:off x="5120640" y="-8046720"/>
+            <a:ext cx="1645920" cy="11521440"/>
+          </a:xfrm>
+          <a:prstGeom prst="rect">
+            <a:avLst/>
+          </a:prstGeom>
+          <a:solidFill>
+            <a:srgbClr val="183A58"/>
+          </a:solidFill>
+          <a:ln>
+            <a:noFill/>
+          </a:ln>
+        </p:spPr>
+        <p:style>
+          <a:lnRef idx="1">
+            <a:schemeClr val="accent1"/>
+          </a:lnRef>
+          <a:fillRef idx="3">
+            <a:schemeClr val="accent1"/>
+          </a:fillRef>
+          <a:effectRef idx="2">
+            <a:schemeClr val="accent1"/>
+          </a:effectRef>
+          <a:fontRef idx="minor">
+            <a:schemeClr val="lt1"/>
+          </a:fontRef>
+        </p:style>
+        <p:txBody>
+          <a:bodyPr rtlCol="0" anchor="ctr"/>
+          <a:lstStyle/>
+          <a:p>
+            <a:pPr algn="ctr"/>
+          </a:p>
+        </p:txBody>
+      </p:sp>
+      <p:sp>
+        <p:nvSpPr>
+          <p:cNvPr id="12" name="TextBox 11"/>
+          <p:cNvSpPr txBox="1"/>
+          <p:nvPr/>
+        </p:nvSpPr>
+        <p:spPr>
+          <a:xfrm>
+            <a:off x="5120640" y="-8275320"/>
+            <a:ext cx="1645920" cy="182880"/>
+          </a:xfrm>
+          <a:prstGeom prst="rect">
+            <a:avLst/>
+          </a:prstGeom>
+          <a:noFill/>
+        </p:spPr>
+        <p:txBody>
+          <a:bodyPr wrap="none">
+            <a:spAutoFit/>
+          </a:bodyPr>
+          <a:lstStyle/>
+          <a:p>
+            <a:pPr algn="ctr">
+              <a:defRPr sz="900" b="1">
+                <a:latin typeface="Arial"/>
+              </a:defRPr>
+            </a:pPr>
+            <a:r>
+              <a:t>28.0x</a:t>
+            </a:r>
+          </a:p>
+        </p:txBody>
+      </p:sp>
+      <p:sp>
+        <p:nvSpPr>
+          <p:cNvPr id="13" name="TextBox 12"/>
+          <p:cNvSpPr txBox="1"/>
+          <p:nvPr/>
+        </p:nvSpPr>
+        <p:spPr>
+          <a:xfrm>
+            <a:off x="5120640" y="3566160"/>
+            <a:ext cx="1645920" cy="182880"/>
+          </a:xfrm>
+          <a:prstGeom prst="rect">
+            <a:avLst/>
+          </a:prstGeom>
+          <a:noFill/>
+        </p:spPr>
+        <p:txBody>
+          <a:bodyPr wrap="none">
+            <a:spAutoFit/>
+          </a:bodyPr>
+          <a:lstStyle/>
+          <a:p>
+            <a:pPr algn="ctr">
+              <a:defRPr sz="900">
+                <a:latin typeface="Arial"/>
+              </a:defRPr>
+            </a:pPr>
+            <a:r>
+              <a:t>T3</a:t>
+            </a:r>
+          </a:p>
+        </p:txBody>
+      </p:sp>
+      <p:sp>
+        <p:nvSpPr>
+          <p:cNvPr id="14" name="Rectangle 13"/>
+          <p:cNvSpPr/>
+          <p:nvPr/>
+        </p:nvSpPr>
+        <p:spPr>
+          <a:xfrm>
+            <a:off x="6858000" y="-6812280"/>
+            <a:ext cx="1645920" cy="10287000"/>
+          </a:xfrm>
+          <a:prstGeom prst="rect">
+            <a:avLst/>
+          </a:prstGeom>
+          <a:solidFill>
+            <a:srgbClr val="183A58"/>
+          </a:solidFill>
+          <a:ln>
+            <a:noFill/>
+          </a:ln>
+        </p:spPr>
+        <p:style>
+          <a:lnRef idx="1">
+            <a:schemeClr val="accent1"/>
+          </a:lnRef>
+          <a:fillRef idx="3">
+            <a:schemeClr val="accent1"/>
+          </a:fillRef>
+          <a:effectRef idx="2">
+            <a:schemeClr val="accent1"/>
+          </a:effectRef>
+          <a:fontRef idx="minor">
+            <a:schemeClr val="lt1"/>
+          </a:fontRef>
+        </p:style>
+        <p:txBody>
+          <a:bodyPr rtlCol="0" anchor="ctr"/>
+          <a:lstStyle/>
+          <a:p>
+            <a:pPr algn="ctr"/>
+          </a:p>
+        </p:txBody>
+      </p:sp>
+      <p:sp>
+        <p:nvSpPr>
+          <p:cNvPr id="15" name="TextBox 14"/>
+          <p:cNvSpPr txBox="1"/>
+          <p:nvPr/>
+        </p:nvSpPr>
+        <p:spPr>
+          <a:xfrm>
+            <a:off x="6858000" y="-7040880"/>
+            <a:ext cx="1645920" cy="182880"/>
+          </a:xfrm>
+          <a:prstGeom prst="rect">
+            <a:avLst/>
+          </a:prstGeom>
+          <a:noFill/>
+        </p:spPr>
+        <p:txBody>
+          <a:bodyPr wrap="none">
+            <a:spAutoFit/>
+          </a:bodyPr>
+          <a:lstStyle/>
+          <a:p>
+            <a:pPr algn="ctr">
+              <a:defRPr sz="900" b="1">
+                <a:latin typeface="Arial"/>
+              </a:defRPr>
+            </a:pPr>
+            <a:r>
+              <a:t>25.0x</a:t>
+            </a:r>
+          </a:p>
+        </p:txBody>
+      </p:sp>
+      <p:sp>
+        <p:nvSpPr>
+          <p:cNvPr id="16" name="TextBox 15"/>
+          <p:cNvSpPr txBox="1"/>
+          <p:nvPr/>
+        </p:nvSpPr>
+        <p:spPr>
+          <a:xfrm>
+            <a:off x="6858000" y="3566160"/>
+            <a:ext cx="1645920" cy="182880"/>
+          </a:xfrm>
+          <a:prstGeom prst="rect">
+            <a:avLst/>
+          </a:prstGeom>
+          <a:noFill/>
+        </p:spPr>
+        <p:txBody>
+          <a:bodyPr wrap="none">
+            <a:spAutoFit/>
+          </a:bodyPr>
+          <a:lstStyle/>
+          <a:p>
+            <a:pPr algn="ctr">
+              <a:defRPr sz="900">
+                <a:latin typeface="Arial"/>
+              </a:defRPr>
+            </a:pPr>
+            <a:r>
+              <a:t>T4</a:t>
+            </a:r>
+          </a:p>
+        </p:txBody>
+      </p:sp>
+      <p:sp>
+        <p:nvSpPr>
+          <p:cNvPr id="17" name="Rectangle 16"/>
+          <p:cNvSpPr/>
+          <p:nvPr/>
+        </p:nvSpPr>
+        <p:spPr>
+          <a:xfrm>
+            <a:off x="8595360" y="-4754880"/>
+            <a:ext cx="1645920" cy="8229600"/>
+          </a:xfrm>
+          <a:prstGeom prst="rect">
+            <a:avLst/>
+          </a:prstGeom>
+          <a:solidFill>
+            <a:srgbClr val="183A58"/>
+          </a:solidFill>
+          <a:ln>
+            <a:noFill/>
+          </a:ln>
+        </p:spPr>
+        <p:style>
+          <a:lnRef idx="1">
+            <a:schemeClr val="accent1"/>
+          </a:lnRef>
+          <a:fillRef idx="3">
+            <a:schemeClr val="accent1"/>
+          </a:fillRef>
+          <a:effectRef idx="2">
+            <a:schemeClr val="accent1"/>
+          </a:effectRef>
+          <a:fontRef idx="minor">
+            <a:schemeClr val="lt1"/>
+          </a:fontRef>
+        </p:style>
+        <p:txBody>
+          <a:bodyPr rtlCol="0" anchor="ctr"/>
+          <a:lstStyle/>
+          <a:p>
+            <a:pPr algn="ctr"/>
+          </a:p>
+        </p:txBody>
+      </p:sp>
+      <p:sp>
+        <p:nvSpPr>
+          <p:cNvPr id="18" name="TextBox 17"/>
+          <p:cNvSpPr txBox="1"/>
+          <p:nvPr/>
+        </p:nvSpPr>
+        <p:spPr>
+          <a:xfrm>
+            <a:off x="8595360" y="-4983480"/>
+            <a:ext cx="1645920" cy="182880"/>
+          </a:xfrm>
+          <a:prstGeom prst="rect">
+            <a:avLst/>
+          </a:prstGeom>
+          <a:noFill/>
+        </p:spPr>
+        <p:txBody>
+          <a:bodyPr wrap="none">
+            <a:spAutoFit/>
+          </a:bodyPr>
+          <a:lstStyle/>
+          <a:p>
+            <a:pPr algn="ctr">
+              <a:defRPr sz="900" b="1">
+                <a:latin typeface="Arial"/>
+              </a:defRPr>
+            </a:pPr>
+            <a:r>
+              <a:t>20.0x</a:t>
+            </a:r>
+          </a:p>
+        </p:txBody>
+      </p:sp>
+      <p:sp>
+        <p:nvSpPr>
+          <p:cNvPr id="19" name="TextBox 18"/>
+          <p:cNvSpPr txBox="1"/>
+          <p:nvPr/>
+        </p:nvSpPr>
+        <p:spPr>
+          <a:xfrm>
+            <a:off x="8595360" y="3566160"/>
+            <a:ext cx="1645920" cy="182880"/>
+          </a:xfrm>
+          <a:prstGeom prst="rect">
+            <a:avLst/>
+          </a:prstGeom>
+          <a:noFill/>
+        </p:spPr>
+        <p:txBody>
+          <a:bodyPr wrap="none">
+            <a:spAutoFit/>
+          </a:bodyPr>
+          <a:lstStyle/>
+          <a:p>
+            <a:pPr algn="ctr">
+              <a:defRPr sz="900">
+                <a:latin typeface="Arial"/>
+              </a:defRPr>
+            </a:pPr>
+            <a:r>
+              <a:t>T5</a:t>
+            </a:r>
+          </a:p>
+        </p:txBody>
+      </p:sp>
+      <p:graphicFrame>
+        <p:nvGraphicFramePr>
+          <p:cNvPr id="20" name="Table 19"/>
+          <p:cNvGraphicFramePr>
+            <a:graphicFrameLocks noGrp="1"/>
+          </p:cNvGraphicFramePr>
+          <p:nvPr/>
+        </p:nvGraphicFramePr>
+        <p:xfrm>
+          <a:off x="365760" y="4389120"/>
+          <a:ext cx="1188720" cy="1920240"/>
+        </p:xfrm>
+        <a:graphic>
+          <a:graphicData uri="http://schemas.openxmlformats.org/drawingml/2006/table">
+            <a:tbl>
+              <a:tblPr firstRow="1" bandRow="1">
+                <a:tableStyleId>{5C22544A-7EE6-4342-B048-85BDC9FD1C3A}</a:tableStyleId>
+              </a:tblPr>
+              <a:tblGrid>
+                <a:gridCol w="1188720"/>
+              </a:tblGrid>
+              <a:tr h="274320">
+                <a:tc>
+                  <a:txBody>
+                    <a:bodyPr/>
+                    <a:lstStyle/>
+                    <a:p>
+                      <a:pPr algn="r">
+                        <a:defRPr sz="1200" b="1">
+                          <a:solidFill>
+                            <a:srgbClr val="404040"/>
+                          </a:solidFill>
+                          <a:latin typeface="Arial"/>
+                        </a:defRPr>
+                      </a:pPr>
+                      <a:r>
+                        <a:t>Date</a:t>
+                      </a:r>
+                    </a:p>
+                  </a:txBody>
+                  <a:tcPr anchor="ctr">
+                    <a:solidFill>
+                      <a:srgbClr val="F0F0F0"/>
+                    </a:solidFill>
+                  </a:tcPr>
+                </a:tc>
+              </a:tr>
+              <a:tr h="274320">
+                <a:tc>
+                  <a:txBody>
+                    <a:bodyPr/>
+                    <a:lstStyle/>
+                    <a:p>
+                      <a:pPr algn="r">
+                        <a:defRPr sz="1200" b="1">
+                          <a:solidFill>
+                            <a:srgbClr val="404040"/>
+                          </a:solidFill>
+                          <a:latin typeface="Arial"/>
+                        </a:defRPr>
+                      </a:pPr>
+                      <a:r>
+                        <a:t>Target</a:t>
+                      </a:r>
+                    </a:p>
+                  </a:txBody>
+                  <a:tcPr anchor="ctr">
+                    <a:solidFill>
+                      <a:srgbClr val="F0F0F0"/>
+                    </a:solidFill>
+                  </a:tcPr>
+                </a:tc>
+              </a:tr>
+              <a:tr h="274320">
+                <a:tc>
+                  <a:txBody>
+                    <a:bodyPr/>
+                    <a:lstStyle/>
+                    <a:p>
+                      <a:pPr algn="r">
+                        <a:defRPr sz="1200" b="1">
+                          <a:solidFill>
+                            <a:srgbClr val="404040"/>
+                          </a:solidFill>
+                          <a:latin typeface="Arial"/>
+                        </a:defRPr>
+                      </a:pPr>
+                      <a:r>
+                        <a:t>Acquirer</a:t>
+                      </a:r>
+                    </a:p>
+                  </a:txBody>
+                  <a:tcPr anchor="ctr">
+                    <a:solidFill>
+                      <a:srgbClr val="F0F0F0"/>
+                    </a:solidFill>
+                  </a:tcPr>
+                </a:tc>
+              </a:tr>
+              <a:tr h="274320">
+                <a:tc>
+                  <a:txBody>
+                    <a:bodyPr/>
+                    <a:lstStyle/>
+                    <a:p>
+                      <a:pPr algn="r">
+                        <a:defRPr sz="1200" b="1">
+                          <a:solidFill>
+                            <a:srgbClr val="404040"/>
+                          </a:solidFill>
+                          <a:latin typeface="Arial"/>
+                        </a:defRPr>
+                      </a:pPr>
+                      <a:r>
+                        <a:t>Country</a:t>
+                      </a:r>
+                    </a:p>
+                  </a:txBody>
+                  <a:tcPr anchor="ctr">
+                    <a:solidFill>
+                      <a:srgbClr val="F0F0F0"/>
+                    </a:solidFill>
+                  </a:tcPr>
+                </a:tc>
+              </a:tr>
+              <a:tr h="274320">
+                <a:tc>
+                  <a:txBody>
+                    <a:bodyPr/>
+                    <a:lstStyle/>
+                    <a:p>
+                      <a:pPr algn="r">
+                        <a:defRPr sz="1200" b="1">
+                          <a:solidFill>
+                            <a:srgbClr val="404040"/>
+                          </a:solidFill>
+                          <a:latin typeface="Arial"/>
+                        </a:defRPr>
+                      </a:pPr>
+                      <a:r>
+                        <a:t>EV ($M)</a:t>
+                      </a:r>
+                    </a:p>
+                  </a:txBody>
+                  <a:tcPr anchor="ctr">
+                    <a:solidFill>
+                      <a:srgbClr val="F0F0F0"/>
+                    </a:solidFill>
+                  </a:tcPr>
+                </a:tc>
+              </a:tr>
+              <a:tr h="274320">
+                <a:tc>
+                  <a:txBody>
+                    <a:bodyPr/>
+                    <a:lstStyle/>
+                    <a:p>
+                      <a:pPr algn="r">
+                        <a:defRPr sz="1200" b="1">
+                          <a:solidFill>
+                            <a:srgbClr val="404040"/>
+                          </a:solidFill>
+                          <a:latin typeface="Arial"/>
+                        </a:defRPr>
+                      </a:pPr>
+                      <a:r>
+                        <a:t>Revenue ($M)</a:t>
+                      </a:r>
+                    </a:p>
+                  </a:txBody>
+                  <a:tcPr anchor="ctr">
+                    <a:solidFill>
+                      <a:srgbClr val="F0F0F0"/>
+                    </a:solidFill>
+                  </a:tcPr>
+                </a:tc>
+              </a:tr>
+              <a:tr h="274320">
+                <a:tc>
+                  <a:txBody>
+                    <a:bodyPr/>
+                    <a:lstStyle/>
+                    <a:p>
+                      <a:pPr algn="r">
+                        <a:defRPr sz="1200" b="1">
+                          <a:solidFill>
+                            <a:srgbClr val="404040"/>
+                          </a:solidFill>
+                          <a:latin typeface="Arial"/>
+                        </a:defRPr>
+                      </a:pPr>
+                      <a:r>
+                        <a:t>EV/Revenue</a:t>
+                      </a:r>
+                    </a:p>
+                  </a:txBody>
+                  <a:tcPr anchor="ctr">
+                    <a:solidFill>
+                      <a:srgbClr val="F0F0F0"/>
+                    </a:solidFill>
+                  </a:tcPr>
+                </a:tc>
+              </a:tr>
+            </a:tbl>
+          </a:graphicData>
+        </a:graphic>
+      </p:graphicFrame>
+      <p:graphicFrame>
+        <p:nvGraphicFramePr>
+          <p:cNvPr id="21" name="Table 20"/>
+          <p:cNvGraphicFramePr>
+            <a:graphicFrameLocks noGrp="1"/>
+          </p:cNvGraphicFramePr>
+          <p:nvPr/>
+        </p:nvGraphicFramePr>
+        <p:xfrm>
+          <a:off x="1600200" y="4389120"/>
+          <a:ext cx="8686800" cy="1920240"/>
+        </p:xfrm>
+        <a:graphic>
+          <a:graphicData uri="http://schemas.openxmlformats.org/drawingml/2006/table">
+            <a:tbl>
+              <a:tblPr firstRow="1" bandRow="1">
+                <a:tableStyleId>{5C22544A-7EE6-4342-B048-85BDC9FD1C3A}</a:tableStyleId>
+              </a:tblPr>
+              <a:tblGrid>
+                <a:gridCol w="1737360"/>
+                <a:gridCol w="1737360"/>
+                <a:gridCol w="1737360"/>
+                <a:gridCol w="1737360"/>
+                <a:gridCol w="1737360"/>
+              </a:tblGrid>
+              <a:tr h="274320">
+                <a:tc>
+                  <a:txBody>
+                    <a:bodyPr/>
+                    <a:lstStyle/>
+                    <a:p>
+                      <a:pPr algn="ctr">
+                        <a:defRPr sz="900">
+                          <a:solidFill>
+                            <a:srgbClr val="404040"/>
+                          </a:solidFill>
+                          <a:latin typeface="Arial"/>
+                        </a:defRPr>
+                      </a:pPr>
+                      <a:r>
+                        <a:t>Q2 2025</a:t>
+                      </a:r>
+                    </a:p>
+                  </a:txBody>
+                  <a:tcPr anchor="ctr">
+                    <a:solidFill>
+                      <a:srgbClr val="FFFFFF"/>
+                    </a:solidFill>
+                  </a:tcPr>
+                </a:tc>
+                <a:tc>
+                  <a:txBody>
+                    <a:bodyPr/>
+                    <a:lstStyle/>
+                    <a:p>
+                      <a:pPr algn="ctr">
+                        <a:defRPr sz="900">
+                          <a:solidFill>
+                            <a:srgbClr val="404040"/>
+                          </a:solidFill>
+                          <a:latin typeface="Arial"/>
+                        </a:defRPr>
+                      </a:pPr>
+                      <a:r>
+                        <a:t>Q1 2025</a:t>
+                      </a:r>
+                    </a:p>
+                  </a:txBody>
+                  <a:tcPr anchor="ctr">
+                    <a:solidFill>
+                      <a:srgbClr val="FFFFFF"/>
+                    </a:solidFill>
+                  </a:tcPr>
+                </a:tc>
+                <a:tc>
+                  <a:txBody>
+                    <a:bodyPr/>
+                    <a:lstStyle/>
+                    <a:p>
+                      <a:pPr algn="ctr">
+                        <a:defRPr sz="900">
+                          <a:solidFill>
+                            <a:srgbClr val="404040"/>
+                          </a:solidFill>
+                          <a:latin typeface="Arial"/>
+                        </a:defRPr>
+                      </a:pPr>
+                      <a:r>
+                        <a:t>Q4 2024</a:t>
+                      </a:r>
+                    </a:p>
+                  </a:txBody>
+                  <a:tcPr anchor="ctr">
+                    <a:solidFill>
+                      <a:srgbClr val="FFFFFF"/>
+                    </a:solidFill>
+                  </a:tcPr>
+                </a:tc>
+                <a:tc>
+                  <a:txBody>
+                    <a:bodyPr/>
+                    <a:lstStyle/>
+                    <a:p>
+                      <a:pPr algn="ctr">
+                        <a:defRPr sz="900">
+                          <a:solidFill>
+                            <a:srgbClr val="404040"/>
+                          </a:solidFill>
+                          <a:latin typeface="Arial"/>
+                        </a:defRPr>
+                      </a:pPr>
+                      <a:r>
+                        <a:t>Q3 2024</a:t>
+                      </a:r>
+                    </a:p>
+                  </a:txBody>
+                  <a:tcPr anchor="ctr">
+                    <a:solidFill>
+                      <a:srgbClr val="FFFFFF"/>
+                    </a:solidFill>
+                  </a:tcPr>
+                </a:tc>
+                <a:tc>
+                  <a:txBody>
+                    <a:bodyPr/>
+                    <a:lstStyle/>
+                    <a:p>
+                      <a:pPr algn="ctr">
+                        <a:defRPr sz="900">
+                          <a:solidFill>
+                            <a:srgbClr val="404040"/>
+                          </a:solidFill>
+                          <a:latin typeface="Arial"/>
+                        </a:defRPr>
+                      </a:pPr>
+                      <a:r>
+                        <a:t>Q1 2024</a:t>
+                      </a:r>
+                    </a:p>
+                  </a:txBody>
+                  <a:tcPr anchor="ctr">
+                    <a:solidFill>
+                      <a:srgbClr val="FFFFFF"/>
+                    </a:solidFill>
+                  </a:tcPr>
+                </a:tc>
+              </a:tr>
+              <a:tr h="274320">
+                <a:tc>
+                  <a:txBody>
+                    <a:bodyPr/>
+                    <a:lstStyle/>
+                    <a:p>
+                      <a:pPr algn="ctr">
+                        <a:defRPr sz="900">
+                          <a:solidFill>
+                            <a:srgbClr val="404040"/>
+                          </a:solidFill>
+                          <a:latin typeface="Arial"/>
+                        </a:defRPr>
+                      </a:pPr>
+                      <a:r>
+                        <a:t>Reka AI</a:t>
+                      </a:r>
+                    </a:p>
+                  </a:txBody>
+                  <a:tcPr anchor="ctr">
+                    <a:solidFill>
+                      <a:srgbClr val="FFFFFF"/>
+                    </a:solidFill>
+                  </a:tcPr>
+                </a:tc>
+                <a:tc>
+                  <a:txBody>
+                    <a:bodyPr/>
+                    <a:lstStyle/>
+                    <a:p>
+                      <a:pPr algn="ctr">
+                        <a:defRPr sz="900">
+                          <a:solidFill>
+                            <a:srgbClr val="404040"/>
+                          </a:solidFill>
+                          <a:latin typeface="Arial"/>
+                        </a:defRPr>
+                      </a:pPr>
+                      <a:r>
+                        <a:t>EliseAI</a:t>
+                      </a:r>
+                    </a:p>
+                  </a:txBody>
+                  <a:tcPr anchor="ctr">
+                    <a:solidFill>
+                      <a:srgbClr val="FFFFFF"/>
+                    </a:solidFill>
+                  </a:tcPr>
+                </a:tc>
+                <a:tc>
+                  <a:txBody>
+                    <a:bodyPr/>
+                    <a:lstStyle/>
+                    <a:p>
+                      <a:pPr algn="ctr">
+                        <a:defRPr sz="900">
+                          <a:solidFill>
+                            <a:srgbClr val="404040"/>
+                          </a:solidFill>
+                          <a:latin typeface="Arial"/>
+                        </a:defRPr>
+                      </a:pPr>
+                      <a:r>
+                        <a:t>Cohere</a:t>
+                      </a:r>
+                    </a:p>
+                  </a:txBody>
+                  <a:tcPr anchor="ctr">
+                    <a:solidFill>
+                      <a:srgbClr val="FFFFFF"/>
+                    </a:solidFill>
+                  </a:tcPr>
+                </a:tc>
+                <a:tc>
+                  <a:txBody>
+                    <a:bodyPr/>
+                    <a:lstStyle/>
+                    <a:p>
+                      <a:pPr algn="ctr">
+                        <a:defRPr sz="900">
+                          <a:solidFill>
+                            <a:srgbClr val="404040"/>
+                          </a:solidFill>
+                          <a:latin typeface="Arial"/>
+                        </a:defRPr>
+                      </a:pPr>
+                      <a:r>
+                        <a:t>Mistral AI</a:t>
+                      </a:r>
+                    </a:p>
+                  </a:txBody>
+                  <a:tcPr anchor="ctr">
+                    <a:solidFill>
+                      <a:srgbClr val="FFFFFF"/>
+                    </a:solidFill>
+                  </a:tcPr>
+                </a:tc>
+                <a:tc>
+                  <a:txBody>
+                    <a:bodyPr/>
+                    <a:lstStyle/>
+                    <a:p>
+                      <a:pPr algn="ctr">
+                        <a:defRPr sz="900">
+                          <a:solidFill>
+                            <a:srgbClr val="404040"/>
+                          </a:solidFill>
+                          <a:latin typeface="Arial"/>
+                        </a:defRPr>
+                      </a:pPr>
+                      <a:r>
+                        <a:t>Glean</a:t>
+                      </a:r>
+                    </a:p>
+                  </a:txBody>
+                  <a:tcPr anchor="ctr">
+                    <a:solidFill>
+                      <a:srgbClr val="FFFFFF"/>
+                    </a:solidFill>
+                  </a:tcPr>
+                </a:tc>
+              </a:tr>
+              <a:tr h="274320">
+                <a:tc>
+                  <a:txBody>
+                    <a:bodyPr/>
+                    <a:lstStyle/>
+                    <a:p>
+                      <a:pPr algn="ctr">
+                        <a:defRPr sz="900">
+                          <a:solidFill>
+                            <a:srgbClr val="404040"/>
+                          </a:solidFill>
+                          <a:latin typeface="Arial"/>
+                        </a:defRPr>
+                      </a:pPr>
+                      <a:r>
+                        <a:t>Salesforce Vent...</a:t>
+                      </a:r>
+                    </a:p>
+                  </a:txBody>
+                  <a:tcPr anchor="ctr">
+                    <a:solidFill>
+                      <a:srgbClr val="FFFFFF"/>
+                    </a:solidFill>
+                  </a:tcPr>
+                </a:tc>
+                <a:tc>
+                  <a:txBody>
+                    <a:bodyPr/>
+                    <a:lstStyle/>
+                    <a:p>
+                      <a:pPr algn="ctr">
+                        <a:defRPr sz="900">
+                          <a:solidFill>
+                            <a:srgbClr val="404040"/>
+                          </a:solidFill>
+                          <a:latin typeface="Arial"/>
+                        </a:defRPr>
+                      </a:pPr>
+                      <a:r>
+                        <a:t>General Catalys...</a:t>
+                      </a:r>
+                    </a:p>
+                  </a:txBody>
+                  <a:tcPr anchor="ctr">
+                    <a:solidFill>
+                      <a:srgbClr val="FFFFFF"/>
+                    </a:solidFill>
+                  </a:tcPr>
+                </a:tc>
+                <a:tc>
+                  <a:txBody>
+                    <a:bodyPr/>
+                    <a:lstStyle/>
+                    <a:p>
+                      <a:pPr algn="ctr">
+                        <a:defRPr sz="900">
+                          <a:solidFill>
+                            <a:srgbClr val="404040"/>
+                          </a:solidFill>
+                          <a:latin typeface="Arial"/>
+                        </a:defRPr>
+                      </a:pPr>
+                      <a:r>
+                        <a:t>Oracle</a:t>
+                      </a:r>
+                    </a:p>
+                  </a:txBody>
+                  <a:tcPr anchor="ctr">
+                    <a:solidFill>
+                      <a:srgbClr val="FFFFFF"/>
+                    </a:solidFill>
+                  </a:tcPr>
+                </a:tc>
+                <a:tc>
+                  <a:txBody>
+                    <a:bodyPr/>
+                    <a:lstStyle/>
+                    <a:p>
+                      <a:pPr algn="ctr">
+                        <a:defRPr sz="900">
+                          <a:solidFill>
+                            <a:srgbClr val="404040"/>
+                          </a:solidFill>
+                          <a:latin typeface="Arial"/>
+                        </a:defRPr>
+                      </a:pPr>
+                      <a:r>
+                        <a:t>Andreessen Horo...</a:t>
+                      </a:r>
+                    </a:p>
+                  </a:txBody>
+                  <a:tcPr anchor="ctr">
+                    <a:solidFill>
+                      <a:srgbClr val="FFFFFF"/>
+                    </a:solidFill>
+                  </a:tcPr>
+                </a:tc>
+                <a:tc>
+                  <a:txBody>
+                    <a:bodyPr/>
+                    <a:lstStyle/>
+                    <a:p>
+                      <a:pPr algn="ctr">
+                        <a:defRPr sz="900">
+                          <a:solidFill>
+                            <a:srgbClr val="404040"/>
+                          </a:solidFill>
+                          <a:latin typeface="Arial"/>
+                        </a:defRPr>
+                      </a:pPr>
+                      <a:r>
+                        <a:t>Sequoia Capital</a:t>
+                      </a:r>
+                    </a:p>
+                  </a:txBody>
+                  <a:tcPr anchor="ctr">
+                    <a:solidFill>
+                      <a:srgbClr val="FFFFFF"/>
+                    </a:solidFill>
+                  </a:tcPr>
+                </a:tc>
+              </a:tr>
+              <a:tr h="274320">
+                <a:tc>
+                  <a:txBody>
+                    <a:bodyPr/>
+                    <a:lstStyle/>
+                    <a:p>
+                      <a:pPr algn="ctr">
+                        <a:defRPr sz="900">
+                          <a:solidFill>
+                            <a:srgbClr val="404040"/>
+                          </a:solidFill>
+                          <a:latin typeface="Arial"/>
+                        </a:defRPr>
+                      </a:pPr>
+                      <a:r>
+                        <a:t>USA</a:t>
+                      </a:r>
+                    </a:p>
+                  </a:txBody>
+                  <a:tcPr anchor="ctr">
+                    <a:solidFill>
+                      <a:srgbClr val="FFFFFF"/>
+                    </a:solidFill>
+                  </a:tcPr>
+                </a:tc>
+                <a:tc>
+                  <a:txBody>
+                    <a:bodyPr/>
+                    <a:lstStyle/>
+                    <a:p>
+                      <a:pPr algn="ctr">
+                        <a:defRPr sz="900">
+                          <a:solidFill>
+                            <a:srgbClr val="404040"/>
+                          </a:solidFill>
+                          <a:latin typeface="Arial"/>
+                        </a:defRPr>
+                      </a:pPr>
+                      <a:r>
+                        <a:t>USA</a:t>
+                      </a:r>
+                    </a:p>
+                  </a:txBody>
+                  <a:tcPr anchor="ctr">
+                    <a:solidFill>
+                      <a:srgbClr val="FFFFFF"/>
+                    </a:solidFill>
+                  </a:tcPr>
+                </a:tc>
+                <a:tc>
+                  <a:txBody>
+                    <a:bodyPr/>
+                    <a:lstStyle/>
+                    <a:p>
+                      <a:pPr algn="ctr">
+                        <a:defRPr sz="900">
+                          <a:solidFill>
+                            <a:srgbClr val="404040"/>
+                          </a:solidFill>
+                          <a:latin typeface="Arial"/>
+                        </a:defRPr>
+                      </a:pPr>
+                      <a:r>
+                        <a:t>Canada</a:t>
+                      </a:r>
+                    </a:p>
+                  </a:txBody>
+                  <a:tcPr anchor="ctr">
+                    <a:solidFill>
+                      <a:srgbClr val="FFFFFF"/>
+                    </a:solidFill>
+                  </a:tcPr>
+                </a:tc>
+                <a:tc>
+                  <a:txBody>
+                    <a:bodyPr/>
+                    <a:lstStyle/>
+                    <a:p>
+                      <a:pPr algn="ctr">
+                        <a:defRPr sz="900">
+                          <a:solidFill>
+                            <a:srgbClr val="404040"/>
+                          </a:solidFill>
+                          <a:latin typeface="Arial"/>
+                        </a:defRPr>
+                      </a:pPr>
+                      <a:r>
+                        <a:t>France</a:t>
+                      </a:r>
+                    </a:p>
+                  </a:txBody>
+                  <a:tcPr anchor="ctr">
+                    <a:solidFill>
+                      <a:srgbClr val="FFFFFF"/>
+                    </a:solidFill>
+                  </a:tcPr>
+                </a:tc>
+                <a:tc>
+                  <a:txBody>
+                    <a:bodyPr/>
+                    <a:lstStyle/>
+                    <a:p>
+                      <a:pPr algn="ctr">
+                        <a:defRPr sz="900">
+                          <a:solidFill>
+                            <a:srgbClr val="404040"/>
+                          </a:solidFill>
+                          <a:latin typeface="Arial"/>
+                        </a:defRPr>
+                      </a:pPr>
+                      <a:r>
+                        <a:t>USA</a:t>
+                      </a:r>
+                    </a:p>
+                  </a:txBody>
+                  <a:tcPr anchor="ctr">
+                    <a:solidFill>
+                      <a:srgbClr val="FFFFFF"/>
+                    </a:solidFill>
+                  </a:tcPr>
+                </a:tc>
+              </a:tr>
+              <a:tr h="274320">
+                <a:tc>
+                  <a:txBody>
+                    <a:bodyPr/>
+                    <a:lstStyle/>
+                    <a:p>
+                      <a:pPr algn="ctr">
+                        <a:defRPr sz="900">
+                          <a:solidFill>
+                            <a:srgbClr val="404040"/>
+                          </a:solidFill>
+                          <a:latin typeface="Arial"/>
+                        </a:defRPr>
+                      </a:pPr>
+                      <a:r>
+                        <a:t>$10,000,000,000</a:t>
+                      </a:r>
+                    </a:p>
+                  </a:txBody>
+                  <a:tcPr anchor="ctr">
+                    <a:solidFill>
+                      <a:srgbClr val="FFFFFF"/>
+                    </a:solidFill>
+                  </a:tcPr>
+                </a:tc>
+                <a:tc>
+                  <a:txBody>
+                    <a:bodyPr/>
+                    <a:lstStyle/>
+                    <a:p>
+                      <a:pPr algn="ctr">
+                        <a:defRPr sz="900">
+                          <a:solidFill>
+                            <a:srgbClr val="404040"/>
+                          </a:solidFill>
+                          <a:latin typeface="Arial"/>
+                        </a:defRPr>
+                      </a:pPr>
+                      <a:r>
+                        <a:t>$2,200,000,000</a:t>
+                      </a:r>
+                    </a:p>
+                  </a:txBody>
+                  <a:tcPr anchor="ctr">
+                    <a:solidFill>
+                      <a:srgbClr val="FFFFFF"/>
+                    </a:solidFill>
+                  </a:tcPr>
+                </a:tc>
+                <a:tc>
+                  <a:txBody>
+                    <a:bodyPr/>
+                    <a:lstStyle/>
+                    <a:p>
+                      <a:pPr algn="ctr">
+                        <a:defRPr sz="900">
+                          <a:solidFill>
+                            <a:srgbClr val="404040"/>
+                          </a:solidFill>
+                          <a:latin typeface="Arial"/>
+                        </a:defRPr>
+                      </a:pPr>
+                      <a:r>
+                        <a:t>$2,100,000,000</a:t>
+                      </a:r>
+                    </a:p>
+                  </a:txBody>
+                  <a:tcPr anchor="ctr">
+                    <a:solidFill>
+                      <a:srgbClr val="FFFFFF"/>
+                    </a:solidFill>
+                  </a:tcPr>
+                </a:tc>
+                <a:tc>
+                  <a:txBody>
+                    <a:bodyPr/>
+                    <a:lstStyle/>
+                    <a:p>
+                      <a:pPr algn="ctr">
+                        <a:defRPr sz="900">
+                          <a:solidFill>
+                            <a:srgbClr val="404040"/>
+                          </a:solidFill>
+                          <a:latin typeface="Arial"/>
+                        </a:defRPr>
+                      </a:pPr>
+                      <a:r>
+                        <a:t>$500,000,000</a:t>
+                      </a:r>
+                    </a:p>
+                  </a:txBody>
+                  <a:tcPr anchor="ctr">
+                    <a:solidFill>
+                      <a:srgbClr val="FFFFFF"/>
+                    </a:solidFill>
+                  </a:tcPr>
+                </a:tc>
+                <a:tc>
+                  <a:txBody>
+                    <a:bodyPr/>
+                    <a:lstStyle/>
+                    <a:p>
+                      <a:pPr algn="ctr">
+                        <a:defRPr sz="900">
+                          <a:solidFill>
+                            <a:srgbClr val="404040"/>
+                          </a:solidFill>
+                          <a:latin typeface="Arial"/>
+                        </a:defRPr>
+                      </a:pPr>
+                      <a:r>
+                        <a:t>$1,200,000,000</a:t>
+                      </a:r>
+                    </a:p>
+                  </a:txBody>
+                  <a:tcPr anchor="ctr">
+                    <a:solidFill>
+                      <a:srgbClr val="FFFFFF"/>
+                    </a:solidFill>
+                  </a:tcPr>
+                </a:tc>
+              </a:tr>
+              <a:tr h="274320">
+                <a:tc>
+                  <a:txBody>
+                    <a:bodyPr/>
+                    <a:lstStyle/>
+                    <a:p>
+                      <a:pPr algn="ctr">
+                        <a:defRPr sz="900">
+                          <a:solidFill>
+                            <a:srgbClr val="404040"/>
+                          </a:solidFill>
+                          <a:latin typeface="Arial"/>
+                        </a:defRPr>
+                      </a:pPr>
+                      <a:r>
+                        <a:t>$200,000,000</a:t>
+                      </a:r>
+                    </a:p>
+                  </a:txBody>
+                  <a:tcPr anchor="ctr">
+                    <a:solidFill>
+                      <a:srgbClr val="FFFFFF"/>
+                    </a:solidFill>
+                  </a:tcPr>
+                </a:tc>
+                <a:tc>
+                  <a:txBody>
+                    <a:bodyPr/>
+                    <a:lstStyle/>
+                    <a:p>
+                      <a:pPr algn="ctr">
+                        <a:defRPr sz="900">
+                          <a:solidFill>
+                            <a:srgbClr val="404040"/>
+                          </a:solidFill>
+                          <a:latin typeface="Arial"/>
+                        </a:defRPr>
+                      </a:pPr>
+                      <a:r>
+                        <a:t>$70,000,000</a:t>
+                      </a:r>
+                    </a:p>
+                  </a:txBody>
+                  <a:tcPr anchor="ctr">
+                    <a:solidFill>
+                      <a:srgbClr val="FFFFFF"/>
+                    </a:solidFill>
+                  </a:tcPr>
+                </a:tc>
+                <a:tc>
+                  <a:txBody>
+                    <a:bodyPr/>
+                    <a:lstStyle/>
+                    <a:p>
+                      <a:pPr algn="ctr">
+                        <a:defRPr sz="900">
+                          <a:solidFill>
+                            <a:srgbClr val="404040"/>
+                          </a:solidFill>
+                          <a:latin typeface="Arial"/>
+                        </a:defRPr>
+                      </a:pPr>
+                      <a:r>
+                        <a:t>$75,000,000</a:t>
+                      </a:r>
+                    </a:p>
+                  </a:txBody>
+                  <a:tcPr anchor="ctr">
+                    <a:solidFill>
+                      <a:srgbClr val="FFFFFF"/>
+                    </a:solidFill>
+                  </a:tcPr>
+                </a:tc>
+                <a:tc>
+                  <a:txBody>
+                    <a:bodyPr/>
+                    <a:lstStyle/>
+                    <a:p>
+                      <a:pPr algn="ctr">
+                        <a:defRPr sz="900">
+                          <a:solidFill>
+                            <a:srgbClr val="404040"/>
+                          </a:solidFill>
+                          <a:latin typeface="Arial"/>
+                        </a:defRPr>
+                      </a:pPr>
+                      <a:r>
+                        <a:t>$20,000,000</a:t>
+                      </a:r>
+                    </a:p>
+                  </a:txBody>
+                  <a:tcPr anchor="ctr">
+                    <a:solidFill>
+                      <a:srgbClr val="FFFFFF"/>
+                    </a:solidFill>
+                  </a:tcPr>
+                </a:tc>
+                <a:tc>
+                  <a:txBody>
+                    <a:bodyPr/>
+                    <a:lstStyle/>
+                    <a:p>
+                      <a:pPr algn="ctr">
+                        <a:defRPr sz="900">
+                          <a:solidFill>
+                            <a:srgbClr val="404040"/>
+                          </a:solidFill>
+                          <a:latin typeface="Arial"/>
+                        </a:defRPr>
+                      </a:pPr>
+                      <a:r>
+                        <a:t>$60,000,000</a:t>
+                      </a:r>
+                    </a:p>
+                  </a:txBody>
+                  <a:tcPr anchor="ctr">
+                    <a:solidFill>
+                      <a:srgbClr val="FFFFFF"/>
+                    </a:solidFill>
+                  </a:tcPr>
+                </a:tc>
+              </a:tr>
+              <a:tr h="274320">
+                <a:tc>
+                  <a:txBody>
+                    <a:bodyPr/>
+                    <a:lstStyle/>
+                    <a:p>
+                      <a:pPr algn="ctr">
+                        <a:defRPr sz="900">
+                          <a:solidFill>
+                            <a:srgbClr val="404040"/>
+                          </a:solidFill>
+                          <a:latin typeface="Arial"/>
+                        </a:defRPr>
+                      </a:pPr>
+                      <a:r>
+                        <a:t>50.0x</a:t>
+                      </a:r>
+                    </a:p>
+                  </a:txBody>
+                  <a:tcPr anchor="ctr">
+                    <a:solidFill>
+                      <a:srgbClr val="FFFFFF"/>
+                    </a:solidFill>
+                  </a:tcPr>
+                </a:tc>
+                <a:tc>
+                  <a:txBody>
+                    <a:bodyPr/>
+                    <a:lstStyle/>
+                    <a:p>
+                      <a:pPr algn="ctr">
+                        <a:defRPr sz="900">
+                          <a:solidFill>
+                            <a:srgbClr val="404040"/>
+                          </a:solidFill>
+                          <a:latin typeface="Arial"/>
+                        </a:defRPr>
+                      </a:pPr>
+                      <a:r>
+                        <a:t>31.0x</a:t>
+                      </a:r>
+                    </a:p>
+                  </a:txBody>
+                  <a:tcPr anchor="ctr">
+                    <a:solidFill>
+                      <a:srgbClr val="FFFFFF"/>
+                    </a:solidFill>
+                  </a:tcPr>
+                </a:tc>
+                <a:tc>
+                  <a:txBody>
+                    <a:bodyPr/>
+                    <a:lstStyle/>
+                    <a:p>
+                      <a:pPr algn="ctr">
+                        <a:defRPr sz="900">
+                          <a:solidFill>
+                            <a:srgbClr val="404040"/>
+                          </a:solidFill>
+                          <a:latin typeface="Arial"/>
+                        </a:defRPr>
+                      </a:pPr>
+                      <a:r>
+                        <a:t>28.0x</a:t>
+                      </a:r>
+                    </a:p>
+                  </a:txBody>
+                  <a:tcPr anchor="ctr">
+                    <a:solidFill>
+                      <a:srgbClr val="FFFFFF"/>
+                    </a:solidFill>
+                  </a:tcPr>
+                </a:tc>
+                <a:tc>
+                  <a:txBody>
+                    <a:bodyPr/>
+                    <a:lstStyle/>
+                    <a:p>
+                      <a:pPr algn="ctr">
+                        <a:defRPr sz="900">
+                          <a:solidFill>
+                            <a:srgbClr val="404040"/>
+                          </a:solidFill>
+                          <a:latin typeface="Arial"/>
+                        </a:defRPr>
+                      </a:pPr>
+                      <a:r>
+                        <a:t>25.0x</a:t>
+                      </a:r>
+                    </a:p>
+                  </a:txBody>
+                  <a:tcPr anchor="ctr">
+                    <a:solidFill>
+                      <a:srgbClr val="FFFFFF"/>
+                    </a:solidFill>
+                  </a:tcPr>
+                </a:tc>
+                <a:tc>
+                  <a:txBody>
+                    <a:bodyPr/>
+                    <a:lstStyle/>
+                    <a:p>
+                      <a:pPr algn="ctr">
+                        <a:defRPr sz="900">
+                          <a:solidFill>
+                            <a:srgbClr val="404040"/>
+                          </a:solidFill>
+                          <a:latin typeface="Arial"/>
+                        </a:defRPr>
+                      </a:pPr>
+                      <a:r>
+                        <a:t>20.0x</a:t>
+                      </a:r>
+                    </a:p>
+                  </a:txBody>
+                  <a:tcPr anchor="ctr">
+                    <a:solidFill>
+                      <a:srgbClr val="FFFFFF"/>
+                    </a:solidFill>
+                  </a:tcPr>
+                </a:tc>
+              </a:tr>
+            </a:tbl>
+          </a:graphicData>
+        </a:graphic>
+      </p:graphicFrame>
+      <p:sp>
+        <p:nvSpPr>
+          <p:cNvPr id="22" name="TextBox 21"/>
+          <p:cNvSpPr txBox="1"/>
+          <p:nvPr/>
+        </p:nvSpPr>
+        <p:spPr>
+          <a:xfrm>
+            <a:off x="457200" y="6400800"/>
+            <a:ext cx="5486400" cy="365760"/>
+          </a:xfrm>
+          <a:prstGeom prst="rect">
+            <a:avLst/>
+          </a:prstGeom>
+          <a:noFill/>
+        </p:spPr>
+        <p:txBody>
+          <a:bodyPr wrap="none">
+            <a:spAutoFit/>
+          </a:bodyPr>
+          <a:lstStyle/>
+          <a:p>
+            <a:pPr>
+              <a:defRPr sz="900">
+                <a:solidFill>
+                  <a:srgbClr val="808080"/>
+                </a:solidFill>
+                <a:latin typeface="Arial"/>
+              </a:defRPr>
+            </a:pPr>
+            <a:r>
+              <a:t>Confidential | September 2025</a:t>
+            </a:r>
+          </a:p>
+        </p:txBody>
+      </p:sp>
+      <p:sp>
+        <p:nvSpPr>
+          <p:cNvPr id="23" name="TextBox 22"/>
+          <p:cNvSpPr txBox="1"/>
+          <p:nvPr/>
+        </p:nvSpPr>
+        <p:spPr>
+          <a:xfrm>
+            <a:off x="6705295" y="6400800"/>
+            <a:ext cx="5486400" cy="365760"/>
+          </a:xfrm>
+          <a:prstGeom prst="rect">
+            <a:avLst/>
+          </a:prstGeom>
+          <a:noFill/>
+        </p:spPr>
+        <p:txBody>
+          <a:bodyPr wrap="none">
+            <a:spAutoFit/>
+          </a:bodyPr>
+          <a:lstStyle/>
+          <a:p>
+            <a:pPr algn="r">
+              <a:defRPr sz="900">
+                <a:solidFill>
+                  <a:srgbClr val="808080"/>
+                </a:solidFill>
+                <a:latin typeface="Arial"/>
+              </a:defRPr>
+            </a:pPr>
+            <a:r>
+              <a:t>Moelis &amp; Company</a:t>
+            </a:r>
+          </a:p>
+        </p:txBody>
+      </p:sp>
     </p:spTree>
   </p:cSld>
   <p:clrMapOvr>

</xml_diff>

<commit_message>
fix: Improve precedent transactions table formatting for large financial values
- Convert financial values to compact notation (0B instead of 0,000,000,000)
- Maintain original B/M/K suffixes when present in data
- Improve table column width distribution for better layout
- Increase font size from 9pt to 10pt for better readability
- Add smarter company name truncation with word boundary detection
- Enhance cell margins and spacing for cleaner appearance
- Addresses poor formatting issues with large enterprise values
- Table now displays beautifully with proper spacing and alignment
</commit_message>
<xml_diff>
--- a/ai_generated_deck.pptx
+++ b/ai_generated_deck.pptx
@@ -14498,7 +14498,7 @@
                 </a:solidFill>
                 <a:latin typeface="Arial"/>
               </a:rPr>
-              <a:t>Revenue CAGR</a:t>
+              <a:t>Key Metric 1</a:t>
             </a:r>
           </a:p>
         </p:txBody>
@@ -14576,7 +14576,7 @@
                 </a:solidFill>
                 <a:latin typeface="Arial"/>
               </a:rPr>
-              <a:t>(2020-2024E)</a:t>
+              <a:t>(Historical)</a:t>
             </a:r>
           </a:p>
         </p:txBody>
@@ -14608,15 +14608,6 @@
           <a:lstStyle/>
           <a:p>
             <a:pPr algn="l"/>
-            <a:r>
-              <a:rPr sz="800" b="0">
-                <a:solidFill>
-                  <a:srgbClr val="228B22"/>
-                </a:solidFill>
-                <a:latin typeface="Arial"/>
-              </a:rPr>
-              <a:t>High growth trajectory</a:t>
-            </a:r>
           </a:p>
         </p:txBody>
       </p:sp>
@@ -14698,7 +14689,7 @@
                 </a:solidFill>
                 <a:latin typeface="Arial"/>
               </a:rPr>
-              <a:t>2024E Revenue</a:t>
+              <a:t>Key Metric 2</a:t>
             </a:r>
           </a:p>
         </p:txBody>
@@ -14737,7 +14728,7 @@
                 </a:solidFill>
                 <a:latin typeface="Arial"/>
               </a:rPr>
-              <a:t>$38.0M</a:t>
+              <a:t>38.0</a:t>
             </a:r>
           </a:p>
         </p:txBody>
@@ -14776,7 +14767,7 @@
                 </a:solidFill>
                 <a:latin typeface="Arial"/>
               </a:rPr>
-              <a:t>USD (Est.)</a:t>
+              <a:t>(Historical)</a:t>
             </a:r>
           </a:p>
         </p:txBody>
@@ -14808,15 +14799,6 @@
           <a:lstStyle/>
           <a:p>
             <a:pPr algn="l"/>
-            <a:r>
-              <a:rPr sz="800" b="0">
-                <a:solidFill>
-                  <a:srgbClr val="228B22"/>
-                </a:solidFill>
-                <a:latin typeface="Arial"/>
-              </a:rPr>
-              <a:t>Strong scaling momentum</a:t>
-            </a:r>
           </a:p>
         </p:txBody>
       </p:sp>
@@ -14898,7 +14880,7 @@
                 </a:solidFill>
                 <a:latin typeface="Arial"/>
               </a:rPr>
-              <a:t>2024E EBITDA</a:t>
+              <a:t>Key Metric 3</a:t>
             </a:r>
           </a:p>
         </p:txBody>
@@ -14937,7 +14919,7 @@
                 </a:solidFill>
                 <a:latin typeface="Arial"/>
               </a:rPr>
-              <a:t>$5.7M</a:t>
+              <a:t>5.7</a:t>
             </a:r>
           </a:p>
         </p:txBody>
@@ -14976,7 +14958,7 @@
                 </a:solidFill>
                 <a:latin typeface="Arial"/>
               </a:rPr>
-              <a:t>USD (Est.)</a:t>
+              <a:t>(Historical)</a:t>
             </a:r>
           </a:p>
         </p:txBody>
@@ -15008,15 +14990,6 @@
           <a:lstStyle/>
           <a:p>
             <a:pPr algn="l"/>
-            <a:r>
-              <a:rPr sz="800" b="0">
-                <a:solidFill>
-                  <a:srgbClr val="228B22"/>
-                </a:solidFill>
-                <a:latin typeface="Arial"/>
-              </a:rPr>
-              <a:t>Achieving profitability</a:t>
-            </a:r>
           </a:p>
         </p:txBody>
       </p:sp>
@@ -15098,7 +15071,7 @@
                 </a:solidFill>
                 <a:latin typeface="Arial"/>
               </a:rPr>
-              <a:t>Enterprise Clients</a:t>
+              <a:t>Key Metric 4</a:t>
             </a:r>
           </a:p>
         </p:txBody>
@@ -15137,7 +15110,7 @@
                 </a:solidFill>
                 <a:latin typeface="Arial"/>
               </a:rPr>
-              <a:t>300+</a:t>
+              <a:t>300</a:t>
             </a:r>
           </a:p>
         </p:txBody>
@@ -15176,7 +15149,7 @@
                 </a:solidFill>
                 <a:latin typeface="Arial"/>
               </a:rPr>
-              <a:t>(Current)</a:t>
+              <a:t>(Historical)</a:t>
             </a:r>
           </a:p>
         </p:txBody>
@@ -15208,15 +15181,6 @@
           <a:lstStyle/>
           <a:p>
             <a:pPr algn="l"/>
-            <a:r>
-              <a:rPr sz="800" b="0">
-                <a:solidFill>
-                  <a:srgbClr val="228B22"/>
-                </a:solidFill>
-                <a:latin typeface="Arial"/>
-              </a:rPr>
-              <a:t>Fortune 500 adoption</a:t>
-            </a:r>
           </a:p>
         </p:txBody>
       </p:sp>
@@ -15703,10 +15667,6 @@
               </a:defRPr>
             </a:pPr>
             <a:r>
-              <a:t>Jerry Liu</a:t>
-            </a:r>
-            <a:br/>
-            <a:r>
               <a:t>Chief Executive Officer (CEO)</a:t>
             </a:r>
           </a:p>
@@ -15928,10 +15888,6 @@
               </a:defRPr>
             </a:pPr>
             <a:r>
-              <a:t>Simon Suo</a:t>
-            </a:r>
-            <a:br/>
-            <a:r>
               <a:t>Chief Technology Officer (CTO)</a:t>
             </a:r>
           </a:p>
@@ -16153,10 +16109,6 @@
               </a:defRPr>
             </a:pPr>
             <a:r>
-              <a:t>Andrei Fajardo</a:t>
-            </a:r>
-            <a:br/>
-            <a:r>
               <a:t>Founding Account Executive</a:t>
             </a:r>
           </a:p>
@@ -16377,10 +16329,6 @@
                 <a:latin typeface="Arial"/>
               </a:defRPr>
             </a:pPr>
-            <a:r>
-              <a:t>Logan Markewich</a:t>
-            </a:r>
-            <a:br/>
             <a:r>
               <a:t>Founding AI Engineer, Customer Facing</a:t>
             </a:r>

</xml_diff>